<commit_message>
Update presentation for Monday, March 26
</commit_message>
<xml_diff>
--- a/SUM Presentations.pptx
+++ b/SUM Presentations.pptx
@@ -52,30 +52,37 @@
     <p:sldId id="297" r:id="rId47"/>
     <p:sldId id="298" r:id="rId48"/>
     <p:sldId id="299" r:id="rId49"/>
+    <p:sldId id="300" r:id="rId50"/>
+    <p:sldId id="301" r:id="rId51"/>
+    <p:sldId id="302" r:id="rId52"/>
+    <p:sldId id="303" r:id="rId53"/>
+    <p:sldId id="304" r:id="rId54"/>
+    <p:sldId id="305" r:id="rId55"/>
+    <p:sldId id="306" r:id="rId56"/>
   </p:sldIdLst>
   <p:sldSz cy="5143500" cx="9144000"/>
   <p:notesSz cx="6858000" cy="9144000"/>
   <p:embeddedFontLst>
     <p:embeddedFont>
       <p:font typeface="Montserrat"/>
-      <p:regular r:id="rId50"/>
-      <p:bold r:id="rId51"/>
-      <p:italic r:id="rId52"/>
-      <p:boldItalic r:id="rId53"/>
+      <p:regular r:id="rId57"/>
+      <p:bold r:id="rId58"/>
+      <p:italic r:id="rId59"/>
+      <p:boldItalic r:id="rId60"/>
     </p:embeddedFont>
     <p:embeddedFont>
       <p:font typeface="Lato"/>
-      <p:regular r:id="rId54"/>
-      <p:bold r:id="rId55"/>
-      <p:italic r:id="rId56"/>
-      <p:boldItalic r:id="rId57"/>
+      <p:regular r:id="rId61"/>
+      <p:bold r:id="rId62"/>
+      <p:italic r:id="rId63"/>
+      <p:boldItalic r:id="rId64"/>
     </p:embeddedFont>
     <p:embeddedFont>
       <p:font typeface="Roboto Mono"/>
-      <p:regular r:id="rId58"/>
-      <p:bold r:id="rId59"/>
-      <p:italic r:id="rId60"/>
-      <p:boldItalic r:id="rId61"/>
+      <p:regular r:id="rId65"/>
+      <p:bold r:id="rId66"/>
+      <p:italic r:id="rId67"/>
+      <p:boldItalic r:id="rId68"/>
     </p:embeddedFont>
   </p:embeddedFontLst>
   <p:defaultTextStyle>
@@ -4807,7 +4814,7 @@
   <p:cSld>
     <p:spTree>
       <p:nvGrpSpPr>
-        <p:cNvPr id="424" name="Shape 424"/>
+        <p:cNvPr id="425" name="Shape 425"/>
         <p:cNvGrpSpPr/>
         <p:nvPr/>
       </p:nvGrpSpPr>
@@ -4821,7 +4828,7 @@
       </p:grpSpPr>
       <p:sp>
         <p:nvSpPr>
-          <p:cNvPr id="425" name="Shape 425"/>
+          <p:cNvPr id="426" name="Shape 426"/>
           <p:cNvSpPr/>
           <p:nvPr>
             <p:ph idx="2" type="sldImg"/>
@@ -4855,7 +4862,7 @@
       </p:sp>
       <p:sp>
         <p:nvSpPr>
-          <p:cNvPr id="426" name="Shape 426"/>
+          <p:cNvPr id="427" name="Shape 427"/>
           <p:cNvSpPr txBox="1"/>
           <p:nvPr>
             <p:ph idx="1" type="body"/>
@@ -4998,6 +5005,496 @@
 </p:notes>
 </file>
 
+<file path=ppt/notesSlides/notesSlide45.xml><?xml version="1.0" encoding="utf-8"?>
+<p:notes xmlns:a="http://schemas.openxmlformats.org/drawingml/2006/main" xmlns:r="http://schemas.openxmlformats.org/officeDocument/2006/relationships" xmlns:mc="http://schemas.openxmlformats.org/markup-compatibility/2006" xmlns:mv="urn:schemas-microsoft-com:mac:vml" xmlns:p="http://schemas.openxmlformats.org/presentationml/2006/main" xmlns:c="http://schemas.openxmlformats.org/drawingml/2006/chart" xmlns:dgm="http://schemas.openxmlformats.org/drawingml/2006/diagram" xmlns:o="urn:schemas-microsoft-com:office:office" xmlns:v="urn:schemas-microsoft-com:vml" xmlns:pvml="urn:schemas-microsoft-com:office:powerpoint" xmlns:com="http://schemas.openxmlformats.org/drawingml/2006/compatibility" xmlns:p14="http://schemas.microsoft.com/office/powerpoint/2010/main" xmlns:p15="http://schemas.microsoft.com/office/powerpoint/2012/main" showMasterPhAnim="0" showMasterSp="0">
+  <p:cSld>
+    <p:spTree>
+      <p:nvGrpSpPr>
+        <p:cNvPr id="438" name="Shape 438"/>
+        <p:cNvGrpSpPr/>
+        <p:nvPr/>
+      </p:nvGrpSpPr>
+      <p:grpSpPr>
+        <a:xfrm>
+          <a:off x="0" y="0"/>
+          <a:ext cx="0" cy="0"/>
+          <a:chOff x="0" y="0"/>
+          <a:chExt cx="0" cy="0"/>
+        </a:xfrm>
+      </p:grpSpPr>
+      <p:sp>
+        <p:nvSpPr>
+          <p:cNvPr id="439" name="Shape 439"/>
+          <p:cNvSpPr/>
+          <p:nvPr>
+            <p:ph idx="2" type="sldImg"/>
+          </p:nvPr>
+        </p:nvSpPr>
+        <p:spPr>
+          <a:xfrm>
+            <a:off x="381300" y="685800"/>
+            <a:ext cx="6096000" cy="3429000"/>
+          </a:xfrm>
+          <a:custGeom>
+            <a:pathLst>
+              <a:path extrusionOk="0" h="120000" w="120000">
+                <a:moveTo>
+                  <a:pt x="0" y="0"/>
+                </a:moveTo>
+                <a:lnTo>
+                  <a:pt x="120000" y="0"/>
+                </a:lnTo>
+                <a:lnTo>
+                  <a:pt x="120000" y="120000"/>
+                </a:lnTo>
+                <a:lnTo>
+                  <a:pt x="0" y="120000"/>
+                </a:lnTo>
+                <a:close/>
+              </a:path>
+            </a:pathLst>
+          </a:custGeom>
+        </p:spPr>
+      </p:sp>
+      <p:sp>
+        <p:nvSpPr>
+          <p:cNvPr id="440" name="Shape 440"/>
+          <p:cNvSpPr txBox="1"/>
+          <p:nvPr>
+            <p:ph idx="1" type="body"/>
+          </p:nvPr>
+        </p:nvSpPr>
+        <p:spPr>
+          <a:xfrm>
+            <a:off x="685800" y="4343400"/>
+            <a:ext cx="5486400" cy="4114800"/>
+          </a:xfrm>
+          <a:prstGeom prst="rect">
+            <a:avLst/>
+          </a:prstGeom>
+        </p:spPr>
+        <p:txBody>
+          <a:bodyPr anchorCtr="0" anchor="t" bIns="91425" lIns="91425" spcFirstLastPara="1" rIns="91425" wrap="square" tIns="91425">
+            <a:noAutofit/>
+          </a:bodyPr>
+          <a:lstStyle/>
+          <a:p>
+            <a:pPr indent="0" lvl="0" marL="0" rtl="0">
+              <a:spcBef>
+                <a:spcPts val="0"/>
+              </a:spcBef>
+              <a:spcAft>
+                <a:spcPts val="0"/>
+              </a:spcAft>
+              <a:buNone/>
+            </a:pPr>
+            <a:r>
+              <a:t/>
+            </a:r>
+            <a:endParaRPr/>
+          </a:p>
+        </p:txBody>
+      </p:sp>
+    </p:spTree>
+  </p:cSld>
+  <p:clrMapOvr>
+    <a:masterClrMapping/>
+  </p:clrMapOvr>
+</p:notes>
+</file>
+
+<file path=ppt/notesSlides/notesSlide46.xml><?xml version="1.0" encoding="utf-8"?>
+<p:notes xmlns:a="http://schemas.openxmlformats.org/drawingml/2006/main" xmlns:r="http://schemas.openxmlformats.org/officeDocument/2006/relationships" xmlns:mc="http://schemas.openxmlformats.org/markup-compatibility/2006" xmlns:mv="urn:schemas-microsoft-com:mac:vml" xmlns:p="http://schemas.openxmlformats.org/presentationml/2006/main" xmlns:c="http://schemas.openxmlformats.org/drawingml/2006/chart" xmlns:dgm="http://schemas.openxmlformats.org/drawingml/2006/diagram" xmlns:o="urn:schemas-microsoft-com:office:office" xmlns:v="urn:schemas-microsoft-com:vml" xmlns:pvml="urn:schemas-microsoft-com:office:powerpoint" xmlns:com="http://schemas.openxmlformats.org/drawingml/2006/compatibility" xmlns:p14="http://schemas.microsoft.com/office/powerpoint/2010/main" xmlns:p15="http://schemas.microsoft.com/office/powerpoint/2012/main" showMasterPhAnim="0" showMasterSp="0">
+  <p:cSld>
+    <p:spTree>
+      <p:nvGrpSpPr>
+        <p:cNvPr id="445" name="Shape 445"/>
+        <p:cNvGrpSpPr/>
+        <p:nvPr/>
+      </p:nvGrpSpPr>
+      <p:grpSpPr>
+        <a:xfrm>
+          <a:off x="0" y="0"/>
+          <a:ext cx="0" cy="0"/>
+          <a:chOff x="0" y="0"/>
+          <a:chExt cx="0" cy="0"/>
+        </a:xfrm>
+      </p:grpSpPr>
+      <p:sp>
+        <p:nvSpPr>
+          <p:cNvPr id="446" name="Shape 446"/>
+          <p:cNvSpPr/>
+          <p:nvPr>
+            <p:ph idx="2" type="sldImg"/>
+          </p:nvPr>
+        </p:nvSpPr>
+        <p:spPr>
+          <a:xfrm>
+            <a:off x="381300" y="685800"/>
+            <a:ext cx="6096000" cy="3429000"/>
+          </a:xfrm>
+          <a:custGeom>
+            <a:pathLst>
+              <a:path extrusionOk="0" h="120000" w="120000">
+                <a:moveTo>
+                  <a:pt x="0" y="0"/>
+                </a:moveTo>
+                <a:lnTo>
+                  <a:pt x="120000" y="0"/>
+                </a:lnTo>
+                <a:lnTo>
+                  <a:pt x="120000" y="120000"/>
+                </a:lnTo>
+                <a:lnTo>
+                  <a:pt x="0" y="120000"/>
+                </a:lnTo>
+                <a:close/>
+              </a:path>
+            </a:pathLst>
+          </a:custGeom>
+        </p:spPr>
+      </p:sp>
+      <p:sp>
+        <p:nvSpPr>
+          <p:cNvPr id="447" name="Shape 447"/>
+          <p:cNvSpPr txBox="1"/>
+          <p:nvPr>
+            <p:ph idx="1" type="body"/>
+          </p:nvPr>
+        </p:nvSpPr>
+        <p:spPr>
+          <a:xfrm>
+            <a:off x="685800" y="4343400"/>
+            <a:ext cx="5486400" cy="4114800"/>
+          </a:xfrm>
+          <a:prstGeom prst="rect">
+            <a:avLst/>
+          </a:prstGeom>
+        </p:spPr>
+        <p:txBody>
+          <a:bodyPr anchorCtr="0" anchor="t" bIns="91425" lIns="91425" spcFirstLastPara="1" rIns="91425" wrap="square" tIns="91425">
+            <a:noAutofit/>
+          </a:bodyPr>
+          <a:lstStyle/>
+          <a:p>
+            <a:pPr indent="0" lvl="0" marL="0" rtl="0">
+              <a:spcBef>
+                <a:spcPts val="0"/>
+              </a:spcBef>
+              <a:spcAft>
+                <a:spcPts val="0"/>
+              </a:spcAft>
+              <a:buNone/>
+            </a:pPr>
+            <a:r>
+              <a:t/>
+            </a:r>
+            <a:endParaRPr/>
+          </a:p>
+        </p:txBody>
+      </p:sp>
+    </p:spTree>
+  </p:cSld>
+  <p:clrMapOvr>
+    <a:masterClrMapping/>
+  </p:clrMapOvr>
+</p:notes>
+</file>
+
+<file path=ppt/notesSlides/notesSlide47.xml><?xml version="1.0" encoding="utf-8"?>
+<p:notes xmlns:a="http://schemas.openxmlformats.org/drawingml/2006/main" xmlns:r="http://schemas.openxmlformats.org/officeDocument/2006/relationships" xmlns:mc="http://schemas.openxmlformats.org/markup-compatibility/2006" xmlns:mv="urn:schemas-microsoft-com:mac:vml" xmlns:p="http://schemas.openxmlformats.org/presentationml/2006/main" xmlns:c="http://schemas.openxmlformats.org/drawingml/2006/chart" xmlns:dgm="http://schemas.openxmlformats.org/drawingml/2006/diagram" xmlns:o="urn:schemas-microsoft-com:office:office" xmlns:v="urn:schemas-microsoft-com:vml" xmlns:pvml="urn:schemas-microsoft-com:office:powerpoint" xmlns:com="http://schemas.openxmlformats.org/drawingml/2006/compatibility" xmlns:p14="http://schemas.microsoft.com/office/powerpoint/2010/main" xmlns:p15="http://schemas.microsoft.com/office/powerpoint/2012/main" showMasterPhAnim="0" showMasterSp="0">
+  <p:cSld>
+    <p:spTree>
+      <p:nvGrpSpPr>
+        <p:cNvPr id="450" name="Shape 450"/>
+        <p:cNvGrpSpPr/>
+        <p:nvPr/>
+      </p:nvGrpSpPr>
+      <p:grpSpPr>
+        <a:xfrm>
+          <a:off x="0" y="0"/>
+          <a:ext cx="0" cy="0"/>
+          <a:chOff x="0" y="0"/>
+          <a:chExt cx="0" cy="0"/>
+        </a:xfrm>
+      </p:grpSpPr>
+      <p:sp>
+        <p:nvSpPr>
+          <p:cNvPr id="451" name="Shape 451"/>
+          <p:cNvSpPr/>
+          <p:nvPr>
+            <p:ph idx="2" type="sldImg"/>
+          </p:nvPr>
+        </p:nvSpPr>
+        <p:spPr>
+          <a:xfrm>
+            <a:off x="381300" y="685800"/>
+            <a:ext cx="6096000" cy="3429000"/>
+          </a:xfrm>
+          <a:custGeom>
+            <a:pathLst>
+              <a:path extrusionOk="0" h="120000" w="120000">
+                <a:moveTo>
+                  <a:pt x="0" y="0"/>
+                </a:moveTo>
+                <a:lnTo>
+                  <a:pt x="120000" y="0"/>
+                </a:lnTo>
+                <a:lnTo>
+                  <a:pt x="120000" y="120000"/>
+                </a:lnTo>
+                <a:lnTo>
+                  <a:pt x="0" y="120000"/>
+                </a:lnTo>
+                <a:close/>
+              </a:path>
+            </a:pathLst>
+          </a:custGeom>
+        </p:spPr>
+      </p:sp>
+      <p:sp>
+        <p:nvSpPr>
+          <p:cNvPr id="452" name="Shape 452"/>
+          <p:cNvSpPr txBox="1"/>
+          <p:nvPr>
+            <p:ph idx="1" type="body"/>
+          </p:nvPr>
+        </p:nvSpPr>
+        <p:spPr>
+          <a:xfrm>
+            <a:off x="685800" y="4343400"/>
+            <a:ext cx="5486400" cy="4114800"/>
+          </a:xfrm>
+          <a:prstGeom prst="rect">
+            <a:avLst/>
+          </a:prstGeom>
+        </p:spPr>
+        <p:txBody>
+          <a:bodyPr anchorCtr="0" anchor="t" bIns="91425" lIns="91425" spcFirstLastPara="1" rIns="91425" wrap="square" tIns="91425">
+            <a:noAutofit/>
+          </a:bodyPr>
+          <a:lstStyle/>
+          <a:p>
+            <a:pPr indent="0" lvl="0" marL="0" rtl="0">
+              <a:spcBef>
+                <a:spcPts val="0"/>
+              </a:spcBef>
+              <a:spcAft>
+                <a:spcPts val="0"/>
+              </a:spcAft>
+              <a:buNone/>
+            </a:pPr>
+            <a:r>
+              <a:t/>
+            </a:r>
+            <a:endParaRPr/>
+          </a:p>
+        </p:txBody>
+      </p:sp>
+    </p:spTree>
+  </p:cSld>
+  <p:clrMapOvr>
+    <a:masterClrMapping/>
+  </p:clrMapOvr>
+</p:notes>
+</file>
+
+<file path=ppt/notesSlides/notesSlide48.xml><?xml version="1.0" encoding="utf-8"?>
+<p:notes xmlns:a="http://schemas.openxmlformats.org/drawingml/2006/main" xmlns:r="http://schemas.openxmlformats.org/officeDocument/2006/relationships" xmlns:mc="http://schemas.openxmlformats.org/markup-compatibility/2006" xmlns:mv="urn:schemas-microsoft-com:mac:vml" xmlns:p="http://schemas.openxmlformats.org/presentationml/2006/main" xmlns:c="http://schemas.openxmlformats.org/drawingml/2006/chart" xmlns:dgm="http://schemas.openxmlformats.org/drawingml/2006/diagram" xmlns:o="urn:schemas-microsoft-com:office:office" xmlns:v="urn:schemas-microsoft-com:vml" xmlns:pvml="urn:schemas-microsoft-com:office:powerpoint" xmlns:com="http://schemas.openxmlformats.org/drawingml/2006/compatibility" xmlns:p14="http://schemas.microsoft.com/office/powerpoint/2010/main" xmlns:p15="http://schemas.microsoft.com/office/powerpoint/2012/main" showMasterPhAnim="0" showMasterSp="0">
+  <p:cSld>
+    <p:spTree>
+      <p:nvGrpSpPr>
+        <p:cNvPr id="456" name="Shape 456"/>
+        <p:cNvGrpSpPr/>
+        <p:nvPr/>
+      </p:nvGrpSpPr>
+      <p:grpSpPr>
+        <a:xfrm>
+          <a:off x="0" y="0"/>
+          <a:ext cx="0" cy="0"/>
+          <a:chOff x="0" y="0"/>
+          <a:chExt cx="0" cy="0"/>
+        </a:xfrm>
+      </p:grpSpPr>
+      <p:sp>
+        <p:nvSpPr>
+          <p:cNvPr id="457" name="Shape 457"/>
+          <p:cNvSpPr/>
+          <p:nvPr>
+            <p:ph idx="2" type="sldImg"/>
+          </p:nvPr>
+        </p:nvSpPr>
+        <p:spPr>
+          <a:xfrm>
+            <a:off x="381300" y="685800"/>
+            <a:ext cx="6096000" cy="3429000"/>
+          </a:xfrm>
+          <a:custGeom>
+            <a:pathLst>
+              <a:path extrusionOk="0" h="120000" w="120000">
+                <a:moveTo>
+                  <a:pt x="0" y="0"/>
+                </a:moveTo>
+                <a:lnTo>
+                  <a:pt x="120000" y="0"/>
+                </a:lnTo>
+                <a:lnTo>
+                  <a:pt x="120000" y="120000"/>
+                </a:lnTo>
+                <a:lnTo>
+                  <a:pt x="0" y="120000"/>
+                </a:lnTo>
+                <a:close/>
+              </a:path>
+            </a:pathLst>
+          </a:custGeom>
+        </p:spPr>
+      </p:sp>
+      <p:sp>
+        <p:nvSpPr>
+          <p:cNvPr id="458" name="Shape 458"/>
+          <p:cNvSpPr txBox="1"/>
+          <p:nvPr>
+            <p:ph idx="1" type="body"/>
+          </p:nvPr>
+        </p:nvSpPr>
+        <p:spPr>
+          <a:xfrm>
+            <a:off x="685800" y="4343400"/>
+            <a:ext cx="5486400" cy="4114800"/>
+          </a:xfrm>
+          <a:prstGeom prst="rect">
+            <a:avLst/>
+          </a:prstGeom>
+        </p:spPr>
+        <p:txBody>
+          <a:bodyPr anchorCtr="0" anchor="t" bIns="91425" lIns="91425" spcFirstLastPara="1" rIns="91425" wrap="square" tIns="91425">
+            <a:noAutofit/>
+          </a:bodyPr>
+          <a:lstStyle/>
+          <a:p>
+            <a:pPr indent="0" lvl="0" marL="0" rtl="0">
+              <a:spcBef>
+                <a:spcPts val="0"/>
+              </a:spcBef>
+              <a:spcAft>
+                <a:spcPts val="0"/>
+              </a:spcAft>
+              <a:buNone/>
+            </a:pPr>
+            <a:r>
+              <a:t/>
+            </a:r>
+            <a:endParaRPr/>
+          </a:p>
+        </p:txBody>
+      </p:sp>
+    </p:spTree>
+  </p:cSld>
+  <p:clrMapOvr>
+    <a:masterClrMapping/>
+  </p:clrMapOvr>
+</p:notes>
+</file>
+
+<file path=ppt/notesSlides/notesSlide49.xml><?xml version="1.0" encoding="utf-8"?>
+<p:notes xmlns:a="http://schemas.openxmlformats.org/drawingml/2006/main" xmlns:r="http://schemas.openxmlformats.org/officeDocument/2006/relationships" xmlns:mc="http://schemas.openxmlformats.org/markup-compatibility/2006" xmlns:mv="urn:schemas-microsoft-com:mac:vml" xmlns:p="http://schemas.openxmlformats.org/presentationml/2006/main" xmlns:c="http://schemas.openxmlformats.org/drawingml/2006/chart" xmlns:dgm="http://schemas.openxmlformats.org/drawingml/2006/diagram" xmlns:o="urn:schemas-microsoft-com:office:office" xmlns:v="urn:schemas-microsoft-com:vml" xmlns:pvml="urn:schemas-microsoft-com:office:powerpoint" xmlns:com="http://schemas.openxmlformats.org/drawingml/2006/compatibility" xmlns:p14="http://schemas.microsoft.com/office/powerpoint/2010/main" xmlns:p15="http://schemas.microsoft.com/office/powerpoint/2012/main" showMasterPhAnim="0" showMasterSp="0">
+  <p:cSld>
+    <p:spTree>
+      <p:nvGrpSpPr>
+        <p:cNvPr id="462" name="Shape 462"/>
+        <p:cNvGrpSpPr/>
+        <p:nvPr/>
+      </p:nvGrpSpPr>
+      <p:grpSpPr>
+        <a:xfrm>
+          <a:off x="0" y="0"/>
+          <a:ext cx="0" cy="0"/>
+          <a:chOff x="0" y="0"/>
+          <a:chExt cx="0" cy="0"/>
+        </a:xfrm>
+      </p:grpSpPr>
+      <p:sp>
+        <p:nvSpPr>
+          <p:cNvPr id="463" name="Shape 463"/>
+          <p:cNvSpPr/>
+          <p:nvPr>
+            <p:ph idx="2" type="sldImg"/>
+          </p:nvPr>
+        </p:nvSpPr>
+        <p:spPr>
+          <a:xfrm>
+            <a:off x="381300" y="685800"/>
+            <a:ext cx="6096000" cy="3429000"/>
+          </a:xfrm>
+          <a:custGeom>
+            <a:pathLst>
+              <a:path extrusionOk="0" h="120000" w="120000">
+                <a:moveTo>
+                  <a:pt x="0" y="0"/>
+                </a:moveTo>
+                <a:lnTo>
+                  <a:pt x="120000" y="0"/>
+                </a:lnTo>
+                <a:lnTo>
+                  <a:pt x="120000" y="120000"/>
+                </a:lnTo>
+                <a:lnTo>
+                  <a:pt x="0" y="120000"/>
+                </a:lnTo>
+                <a:close/>
+              </a:path>
+            </a:pathLst>
+          </a:custGeom>
+        </p:spPr>
+      </p:sp>
+      <p:sp>
+        <p:nvSpPr>
+          <p:cNvPr id="464" name="Shape 464"/>
+          <p:cNvSpPr txBox="1"/>
+          <p:nvPr>
+            <p:ph idx="1" type="body"/>
+          </p:nvPr>
+        </p:nvSpPr>
+        <p:spPr>
+          <a:xfrm>
+            <a:off x="685800" y="4343400"/>
+            <a:ext cx="5486400" cy="4114800"/>
+          </a:xfrm>
+          <a:prstGeom prst="rect">
+            <a:avLst/>
+          </a:prstGeom>
+        </p:spPr>
+        <p:txBody>
+          <a:bodyPr anchorCtr="0" anchor="t" bIns="91425" lIns="91425" spcFirstLastPara="1" rIns="91425" wrap="square" tIns="91425">
+            <a:noAutofit/>
+          </a:bodyPr>
+          <a:lstStyle/>
+          <a:p>
+            <a:pPr indent="0" lvl="0" marL="0" rtl="0">
+              <a:spcBef>
+                <a:spcPts val="0"/>
+              </a:spcBef>
+              <a:spcAft>
+                <a:spcPts val="0"/>
+              </a:spcAft>
+              <a:buNone/>
+            </a:pPr>
+            <a:r>
+              <a:t/>
+            </a:r>
+            <a:endParaRPr/>
+          </a:p>
+        </p:txBody>
+      </p:sp>
+    </p:spTree>
+  </p:cSld>
+  <p:clrMapOvr>
+    <a:masterClrMapping/>
+  </p:clrMapOvr>
+</p:notes>
+</file>
+
 <file path=ppt/notesSlides/notesSlide5.xml><?xml version="1.0" encoding="utf-8"?>
 <p:notes xmlns:a="http://schemas.openxmlformats.org/drawingml/2006/main" xmlns:r="http://schemas.openxmlformats.org/officeDocument/2006/relationships" xmlns:mc="http://schemas.openxmlformats.org/markup-compatibility/2006" xmlns:mv="urn:schemas-microsoft-com:mac:vml" xmlns:p="http://schemas.openxmlformats.org/presentationml/2006/main" xmlns:c="http://schemas.openxmlformats.org/drawingml/2006/chart" xmlns:dgm="http://schemas.openxmlformats.org/drawingml/2006/diagram" xmlns:o="urn:schemas-microsoft-com:office:office" xmlns:v="urn:schemas-microsoft-com:vml" xmlns:pvml="urn:schemas-microsoft-com:office:powerpoint" xmlns:com="http://schemas.openxmlformats.org/drawingml/2006/compatibility" xmlns:p14="http://schemas.microsoft.com/office/powerpoint/2010/main" xmlns:p15="http://schemas.microsoft.com/office/powerpoint/2012/main" showMasterPhAnim="0" showMasterSp="0">
   <p:cSld>
@@ -5084,6 +5581,202 @@
             <a:r>
               <a:rPr lang="en"/>
               <a:t>Jessica, Michael (3 each)</a:t>
+            </a:r>
+            <a:endParaRPr/>
+          </a:p>
+        </p:txBody>
+      </p:sp>
+    </p:spTree>
+  </p:cSld>
+  <p:clrMapOvr>
+    <a:masterClrMapping/>
+  </p:clrMapOvr>
+</p:notes>
+</file>
+
+<file path=ppt/notesSlides/notesSlide50.xml><?xml version="1.0" encoding="utf-8"?>
+<p:notes xmlns:a="http://schemas.openxmlformats.org/drawingml/2006/main" xmlns:r="http://schemas.openxmlformats.org/officeDocument/2006/relationships" xmlns:mc="http://schemas.openxmlformats.org/markup-compatibility/2006" xmlns:mv="urn:schemas-microsoft-com:mac:vml" xmlns:p="http://schemas.openxmlformats.org/presentationml/2006/main" xmlns:c="http://schemas.openxmlformats.org/drawingml/2006/chart" xmlns:dgm="http://schemas.openxmlformats.org/drawingml/2006/diagram" xmlns:o="urn:schemas-microsoft-com:office:office" xmlns:v="urn:schemas-microsoft-com:vml" xmlns:pvml="urn:schemas-microsoft-com:office:powerpoint" xmlns:com="http://schemas.openxmlformats.org/drawingml/2006/compatibility" xmlns:p14="http://schemas.microsoft.com/office/powerpoint/2010/main" xmlns:p15="http://schemas.microsoft.com/office/powerpoint/2012/main" showMasterPhAnim="0" showMasterSp="0">
+  <p:cSld>
+    <p:spTree>
+      <p:nvGrpSpPr>
+        <p:cNvPr id="469" name="Shape 469"/>
+        <p:cNvGrpSpPr/>
+        <p:nvPr/>
+      </p:nvGrpSpPr>
+      <p:grpSpPr>
+        <a:xfrm>
+          <a:off x="0" y="0"/>
+          <a:ext cx="0" cy="0"/>
+          <a:chOff x="0" y="0"/>
+          <a:chExt cx="0" cy="0"/>
+        </a:xfrm>
+      </p:grpSpPr>
+      <p:sp>
+        <p:nvSpPr>
+          <p:cNvPr id="470" name="Shape 470"/>
+          <p:cNvSpPr/>
+          <p:nvPr>
+            <p:ph idx="2" type="sldImg"/>
+          </p:nvPr>
+        </p:nvSpPr>
+        <p:spPr>
+          <a:xfrm>
+            <a:off x="381300" y="685800"/>
+            <a:ext cx="6096000" cy="3429000"/>
+          </a:xfrm>
+          <a:custGeom>
+            <a:pathLst>
+              <a:path extrusionOk="0" h="120000" w="120000">
+                <a:moveTo>
+                  <a:pt x="0" y="0"/>
+                </a:moveTo>
+                <a:lnTo>
+                  <a:pt x="120000" y="0"/>
+                </a:lnTo>
+                <a:lnTo>
+                  <a:pt x="120000" y="120000"/>
+                </a:lnTo>
+                <a:lnTo>
+                  <a:pt x="0" y="120000"/>
+                </a:lnTo>
+                <a:close/>
+              </a:path>
+            </a:pathLst>
+          </a:custGeom>
+        </p:spPr>
+      </p:sp>
+      <p:sp>
+        <p:nvSpPr>
+          <p:cNvPr id="471" name="Shape 471"/>
+          <p:cNvSpPr txBox="1"/>
+          <p:nvPr>
+            <p:ph idx="1" type="body"/>
+          </p:nvPr>
+        </p:nvSpPr>
+        <p:spPr>
+          <a:xfrm>
+            <a:off x="685800" y="4343400"/>
+            <a:ext cx="5486400" cy="4114800"/>
+          </a:xfrm>
+          <a:prstGeom prst="rect">
+            <a:avLst/>
+          </a:prstGeom>
+        </p:spPr>
+        <p:txBody>
+          <a:bodyPr anchorCtr="0" anchor="t" bIns="91425" lIns="91425" spcFirstLastPara="1" rIns="91425" wrap="square" tIns="91425">
+            <a:noAutofit/>
+          </a:bodyPr>
+          <a:lstStyle/>
+          <a:p>
+            <a:pPr indent="0" lvl="0" marL="0" rtl="0">
+              <a:spcBef>
+                <a:spcPts val="0"/>
+              </a:spcBef>
+              <a:spcAft>
+                <a:spcPts val="0"/>
+              </a:spcAft>
+              <a:buNone/>
+            </a:pPr>
+            <a:r>
+              <a:t/>
+            </a:r>
+            <a:endParaRPr/>
+          </a:p>
+        </p:txBody>
+      </p:sp>
+    </p:spTree>
+  </p:cSld>
+  <p:clrMapOvr>
+    <a:masterClrMapping/>
+  </p:clrMapOvr>
+</p:notes>
+</file>
+
+<file path=ppt/notesSlides/notesSlide51.xml><?xml version="1.0" encoding="utf-8"?>
+<p:notes xmlns:a="http://schemas.openxmlformats.org/drawingml/2006/main" xmlns:r="http://schemas.openxmlformats.org/officeDocument/2006/relationships" xmlns:mc="http://schemas.openxmlformats.org/markup-compatibility/2006" xmlns:mv="urn:schemas-microsoft-com:mac:vml" xmlns:p="http://schemas.openxmlformats.org/presentationml/2006/main" xmlns:c="http://schemas.openxmlformats.org/drawingml/2006/chart" xmlns:dgm="http://schemas.openxmlformats.org/drawingml/2006/diagram" xmlns:o="urn:schemas-microsoft-com:office:office" xmlns:v="urn:schemas-microsoft-com:vml" xmlns:pvml="urn:schemas-microsoft-com:office:powerpoint" xmlns:com="http://schemas.openxmlformats.org/drawingml/2006/compatibility" xmlns:p14="http://schemas.microsoft.com/office/powerpoint/2010/main" xmlns:p15="http://schemas.microsoft.com/office/powerpoint/2012/main" showMasterPhAnim="0" showMasterSp="0">
+  <p:cSld>
+    <p:spTree>
+      <p:nvGrpSpPr>
+        <p:cNvPr id="475" name="Shape 475"/>
+        <p:cNvGrpSpPr/>
+        <p:nvPr/>
+      </p:nvGrpSpPr>
+      <p:grpSpPr>
+        <a:xfrm>
+          <a:off x="0" y="0"/>
+          <a:ext cx="0" cy="0"/>
+          <a:chOff x="0" y="0"/>
+          <a:chExt cx="0" cy="0"/>
+        </a:xfrm>
+      </p:grpSpPr>
+      <p:sp>
+        <p:nvSpPr>
+          <p:cNvPr id="476" name="Shape 476"/>
+          <p:cNvSpPr/>
+          <p:nvPr>
+            <p:ph idx="2" type="sldImg"/>
+          </p:nvPr>
+        </p:nvSpPr>
+        <p:spPr>
+          <a:xfrm>
+            <a:off x="381300" y="685800"/>
+            <a:ext cx="6096000" cy="3429000"/>
+          </a:xfrm>
+          <a:custGeom>
+            <a:pathLst>
+              <a:path extrusionOk="0" h="120000" w="120000">
+                <a:moveTo>
+                  <a:pt x="0" y="0"/>
+                </a:moveTo>
+                <a:lnTo>
+                  <a:pt x="120000" y="0"/>
+                </a:lnTo>
+                <a:lnTo>
+                  <a:pt x="120000" y="120000"/>
+                </a:lnTo>
+                <a:lnTo>
+                  <a:pt x="0" y="120000"/>
+                </a:lnTo>
+                <a:close/>
+              </a:path>
+            </a:pathLst>
+          </a:custGeom>
+        </p:spPr>
+      </p:sp>
+      <p:sp>
+        <p:nvSpPr>
+          <p:cNvPr id="477" name="Shape 477"/>
+          <p:cNvSpPr txBox="1"/>
+          <p:nvPr>
+            <p:ph idx="1" type="body"/>
+          </p:nvPr>
+        </p:nvSpPr>
+        <p:spPr>
+          <a:xfrm>
+            <a:off x="685800" y="4343400"/>
+            <a:ext cx="5486400" cy="4114800"/>
+          </a:xfrm>
+          <a:prstGeom prst="rect">
+            <a:avLst/>
+          </a:prstGeom>
+        </p:spPr>
+        <p:txBody>
+          <a:bodyPr anchorCtr="0" anchor="t" bIns="91425" lIns="91425" spcFirstLastPara="1" rIns="91425" wrap="square" tIns="91425">
+            <a:noAutofit/>
+          </a:bodyPr>
+          <a:lstStyle/>
+          <a:p>
+            <a:pPr indent="0" lvl="0" marL="0" rtl="0">
+              <a:spcBef>
+                <a:spcPts val="0"/>
+              </a:spcBef>
+              <a:spcAft>
+                <a:spcPts val="0"/>
+              </a:spcAft>
+              <a:buNone/>
+            </a:pPr>
+            <a:r>
+              <a:t/>
             </a:r>
             <a:endParaRPr/>
           </a:p>
@@ -13794,7 +14487,7 @@
             <a:tbl>
               <a:tblPr>
                 <a:noFill/>
-                <a:tableStyleId>{CB3C8FDC-89F4-40C8-B7FC-8369F436919C}</a:tableStyleId>
+                <a:tableStyleId>{87B8963E-5412-4145-8AB6-BC64BA2F392C}</a:tableStyleId>
               </a:tblPr>
               <a:tblGrid>
                 <a:gridCol w="1199350"/>
@@ -18442,7 +19135,7 @@
             <a:tbl>
               <a:tblPr>
                 <a:noFill/>
-                <a:tableStyleId>{CB3C8FDC-89F4-40C8-B7FC-8369F436919C}</a:tableStyleId>
+                <a:tableStyleId>{87B8963E-5412-4145-8AB6-BC64BA2F392C}</a:tableStyleId>
               </a:tblPr>
               <a:tblGrid>
                 <a:gridCol w="1788200"/>
@@ -20548,7 +21241,7 @@
             <a:tbl>
               <a:tblPr>
                 <a:noFill/>
-                <a:tableStyleId>{CB3C8FDC-89F4-40C8-B7FC-8369F436919C}</a:tableStyleId>
+                <a:tableStyleId>{87B8963E-5412-4145-8AB6-BC64BA2F392C}</a:tableStyleId>
               </a:tblPr>
               <a:tblGrid>
                 <a:gridCol w="2119300"/>
@@ -21343,7 +22036,7 @@
             <a:tbl>
               <a:tblPr>
                 <a:noFill/>
-                <a:tableStyleId>{CB3C8FDC-89F4-40C8-B7FC-8369F436919C}</a:tableStyleId>
+                <a:tableStyleId>{87B8963E-5412-4145-8AB6-BC64BA2F392C}</a:tableStyleId>
               </a:tblPr>
               <a:tblGrid>
                 <a:gridCol w="815250"/>
@@ -21855,7 +22548,7 @@
             <a:tbl>
               <a:tblPr>
                 <a:noFill/>
-                <a:tableStyleId>{CB3C8FDC-89F4-40C8-B7FC-8369F436919C}</a:tableStyleId>
+                <a:tableStyleId>{87B8963E-5412-4145-8AB6-BC64BA2F392C}</a:tableStyleId>
               </a:tblPr>
               <a:tblGrid>
                 <a:gridCol w="1967400"/>
@@ -23185,61 +23878,61 @@
               <a:buNone/>
             </a:pPr>
             <a:r>
-              <a:rPr lang="en"/>
+              <a:rPr lang="en" sz="1400"/>
               <a:t>Worked on:</a:t>
             </a:r>
-            <a:endParaRPr/>
-          </a:p>
-          <a:p>
-            <a:pPr indent="-311150" lvl="0" marL="457200" rtl="0">
+            <a:endParaRPr sz="1400"/>
+          </a:p>
+          <a:p>
+            <a:pPr indent="-317500" lvl="0" marL="457200" rtl="0">
               <a:spcBef>
                 <a:spcPts val="1600"/>
               </a:spcBef>
               <a:spcAft>
                 <a:spcPts val="0"/>
               </a:spcAft>
-              <a:buSzPts val="1300"/>
+              <a:buSzPts val="1400"/>
               <a:buChar char="●"/>
             </a:pPr>
             <a:r>
-              <a:rPr lang="en"/>
+              <a:rPr lang="en" sz="1400"/>
               <a:t>Import/Export Subsystem</a:t>
             </a:r>
-            <a:endParaRPr/>
-          </a:p>
-          <a:p>
-            <a:pPr indent="-298450" lvl="1" marL="914400" rtl="0">
-              <a:spcBef>
-                <a:spcPts val="0"/>
-              </a:spcBef>
-              <a:spcAft>
-                <a:spcPts val="0"/>
-              </a:spcAft>
-              <a:buSzPts val="1100"/>
+            <a:endParaRPr sz="1400"/>
+          </a:p>
+          <a:p>
+            <a:pPr indent="-317500" lvl="1" marL="914400" rtl="0">
+              <a:spcBef>
+                <a:spcPts val="0"/>
+              </a:spcBef>
+              <a:spcAft>
+                <a:spcPts val="0"/>
+              </a:spcAft>
+              <a:buSzPts val="1400"/>
               <a:buChar char="○"/>
             </a:pPr>
             <a:r>
-              <a:rPr lang="en"/>
+              <a:rPr lang="en" sz="1400"/>
               <a:t>Began work on cloud sync</a:t>
             </a:r>
-            <a:endParaRPr/>
-          </a:p>
-          <a:p>
-            <a:pPr indent="-298450" lvl="1" marL="914400">
-              <a:spcBef>
-                <a:spcPts val="0"/>
-              </a:spcBef>
-              <a:spcAft>
-                <a:spcPts val="0"/>
-              </a:spcAft>
-              <a:buSzPts val="1100"/>
+            <a:endParaRPr sz="1400"/>
+          </a:p>
+          <a:p>
+            <a:pPr indent="-317500" lvl="1" marL="914400">
+              <a:spcBef>
+                <a:spcPts val="0"/>
+              </a:spcBef>
+              <a:spcAft>
+                <a:spcPts val="0"/>
+              </a:spcAft>
+              <a:buSzPts val="1400"/>
               <a:buChar char="○"/>
             </a:pPr>
             <a:r>
-              <a:rPr lang="en"/>
+              <a:rPr lang="en" sz="1400"/>
               <a:t>Issue #15: As a user I want to backup my notes</a:t>
             </a:r>
-            <a:endParaRPr/>
+            <a:endParaRPr sz="1400"/>
           </a:p>
           <a:p>
             <a:pPr indent="0" lvl="0" marL="0">
@@ -23252,44 +23945,44 @@
               <a:buNone/>
             </a:pPr>
             <a:r>
-              <a:rPr lang="en"/>
+              <a:rPr lang="en" sz="1400"/>
               <a:t>This Sprint:</a:t>
             </a:r>
-            <a:endParaRPr/>
-          </a:p>
-          <a:p>
-            <a:pPr indent="-311150" lvl="0" marL="457200" rtl="0">
+            <a:endParaRPr sz="1400"/>
+          </a:p>
+          <a:p>
+            <a:pPr indent="-317500" lvl="0" marL="457200" rtl="0">
               <a:spcBef>
                 <a:spcPts val="1600"/>
               </a:spcBef>
               <a:spcAft>
                 <a:spcPts val="0"/>
               </a:spcAft>
-              <a:buSzPts val="1300"/>
+              <a:buSzPts val="1400"/>
               <a:buChar char="●"/>
             </a:pPr>
             <a:r>
-              <a:rPr lang="en"/>
+              <a:rPr lang="en" sz="1400"/>
               <a:t>Finish cloud sync implementation</a:t>
             </a:r>
-            <a:endParaRPr/>
-          </a:p>
-          <a:p>
-            <a:pPr indent="-298450" lvl="1" marL="914400">
-              <a:spcBef>
-                <a:spcPts val="0"/>
-              </a:spcBef>
-              <a:spcAft>
-                <a:spcPts val="0"/>
-              </a:spcAft>
-              <a:buSzPts val="1100"/>
+            <a:endParaRPr sz="1400"/>
+          </a:p>
+          <a:p>
+            <a:pPr indent="-317500" lvl="1" marL="914400">
+              <a:spcBef>
+                <a:spcPts val="0"/>
+              </a:spcBef>
+              <a:spcAft>
+                <a:spcPts val="0"/>
+              </a:spcAft>
+              <a:buSzPts val="1400"/>
               <a:buChar char="○"/>
             </a:pPr>
             <a:r>
-              <a:rPr lang="en"/>
+              <a:rPr lang="en" sz="1400"/>
               <a:t>Android Share Intent</a:t>
             </a:r>
-            <a:endParaRPr/>
+            <a:endParaRPr sz="1400"/>
           </a:p>
         </p:txBody>
       </p:sp>
@@ -23692,7 +24385,7 @@
             </a:pPr>
             <a:r>
               <a:rPr lang="en"/>
-              <a:t>Security Documentation</a:t>
+              <a:t>User Security Policy</a:t>
             </a:r>
             <a:endParaRPr/>
           </a:p>
@@ -23709,15 +24402,7 @@
             </a:pPr>
             <a:r>
               <a:rPr lang="en"/>
-              <a:t>Setting up and </a:t>
-            </a:r>
-            <a:r>
-              <a:rPr lang="en"/>
-              <a:t>formatting Overleaf template </a:t>
-            </a:r>
-            <a:r>
-              <a:rPr lang="en"/>
-              <a:t> </a:t>
+              <a:t>Terms of Service</a:t>
             </a:r>
             <a:endParaRPr/>
           </a:p>
@@ -23734,7 +24419,40 @@
             </a:pPr>
             <a:r>
               <a:rPr lang="en"/>
-              <a:t>https://www.overleaf.com/14831812zjhvbqpqyrbq#/56470723/</a:t>
+              <a:t>Privacy Policy</a:t>
+            </a:r>
+            <a:endParaRPr/>
+          </a:p>
+          <a:p>
+            <a:pPr indent="0" lvl="0" marL="0" rtl="0">
+              <a:spcBef>
+                <a:spcPts val="1600"/>
+              </a:spcBef>
+              <a:spcAft>
+                <a:spcPts val="0"/>
+              </a:spcAft>
+              <a:buNone/>
+            </a:pPr>
+            <a:r>
+              <a:rPr lang="en"/>
+              <a:t>Issues:</a:t>
+            </a:r>
+            <a:endParaRPr/>
+          </a:p>
+          <a:p>
+            <a:pPr indent="-311150" lvl="0" marL="457200" rtl="0">
+              <a:spcBef>
+                <a:spcPts val="1600"/>
+              </a:spcBef>
+              <a:spcAft>
+                <a:spcPts val="0"/>
+              </a:spcAft>
+              <a:buSzPts val="1300"/>
+              <a:buChar char="●"/>
+            </a:pPr>
+            <a:r>
+              <a:rPr lang="en"/>
+              <a:t>As a user I want to understand the privacy and security policies before I install the app</a:t>
             </a:r>
             <a:endParaRPr/>
           </a:p>
@@ -23767,12 +24485,12 @@
             </a:pPr>
             <a:r>
               <a:rPr lang="en"/>
-              <a:t>Finishing security documentation</a:t>
+              <a:t>Researching and implementing a biometric option for decryption</a:t>
             </a:r>
             <a:endParaRPr/>
           </a:p>
           <a:p>
-            <a:pPr indent="-311150" lvl="0" marL="457200">
+            <a:pPr indent="-311150" lvl="0" marL="457200" rtl="0">
               <a:spcBef>
                 <a:spcPts val="0"/>
               </a:spcBef>
@@ -23784,16 +24502,57 @@
             </a:pPr>
             <a:r>
               <a:rPr lang="en"/>
-              <a:t>Begin legal documentation </a:t>
-            </a:r>
+              <a:t>Finishing security documentation </a:t>
+            </a:r>
+            <a:endParaRPr/>
+          </a:p>
+          <a:p>
+            <a:pPr indent="-311150" lvl="0" marL="457200" rtl="0">
+              <a:spcBef>
+                <a:spcPts val="0"/>
+              </a:spcBef>
+              <a:spcAft>
+                <a:spcPts val="0"/>
+              </a:spcAft>
+              <a:buSzPts val="1300"/>
+              <a:buChar char="●"/>
+            </a:pPr>
             <a:r>
               <a:rPr lang="en"/>
-              <a:t> </a:t>
+              <a:t>User Manual </a:t>
             </a:r>
             <a:endParaRPr/>
           </a:p>
         </p:txBody>
       </p:sp>
+      <p:pic>
+        <p:nvPicPr>
+          <p:cNvPr id="424" name="Shape 424"/>
+          <p:cNvPicPr preferRelativeResize="0"/>
+          <p:nvPr/>
+        </p:nvPicPr>
+        <p:blipFill>
+          <a:blip r:embed="rId3">
+            <a:alphaModFix/>
+          </a:blip>
+          <a:stretch>
+            <a:fillRect/>
+          </a:stretch>
+        </p:blipFill>
+        <p:spPr>
+          <a:xfrm>
+            <a:off x="4967123" y="588600"/>
+            <a:ext cx="2947000" cy="2459199"/>
+          </a:xfrm>
+          <a:prstGeom prst="rect">
+            <a:avLst/>
+          </a:prstGeom>
+          <a:noFill/>
+          <a:ln>
+            <a:noFill/>
+          </a:ln>
+        </p:spPr>
+      </p:pic>
     </p:spTree>
   </p:cSld>
   <p:clrMapOvr>
@@ -23807,7 +24566,7 @@
   <p:cSld>
     <p:spTree>
       <p:nvGrpSpPr>
-        <p:cNvPr id="427" name="Shape 427"/>
+        <p:cNvPr id="428" name="Shape 428"/>
         <p:cNvGrpSpPr/>
         <p:nvPr/>
       </p:nvGrpSpPr>
@@ -23821,7 +24580,7 @@
       </p:grpSpPr>
       <p:sp>
         <p:nvSpPr>
-          <p:cNvPr id="428" name="Shape 428"/>
+          <p:cNvPr id="429" name="Shape 429"/>
           <p:cNvSpPr txBox="1"/>
           <p:nvPr>
             <p:ph type="title"/>
@@ -23829,7 +24588,7 @@
         </p:nvSpPr>
         <p:spPr>
           <a:xfrm>
-            <a:off x="1297500" y="393750"/>
+            <a:off x="1297500" y="380000"/>
             <a:ext cx="7038900" cy="914100"/>
           </a:xfrm>
           <a:prstGeom prst="rect">
@@ -23853,7 +24612,7 @@
             </a:pPr>
             <a:r>
               <a:rPr lang="en"/>
-              <a:t>Michael</a:t>
+              <a:t>Luke</a:t>
             </a:r>
             <a:endParaRPr/>
           </a:p>
@@ -23861,7 +24620,7 @@
       </p:sp>
       <p:sp>
         <p:nvSpPr>
-          <p:cNvPr id="429" name="Shape 429"/>
+          <p:cNvPr id="430" name="Shape 430"/>
           <p:cNvSpPr txBox="1"/>
           <p:nvPr>
             <p:ph idx="1" type="body"/>
@@ -23869,7 +24628,7 @@
         </p:nvSpPr>
         <p:spPr>
           <a:xfrm>
-            <a:off x="1297500" y="1581300"/>
+            <a:off x="1297500" y="1567550"/>
             <a:ext cx="7038900" cy="2911200"/>
           </a:xfrm>
           <a:prstGeom prst="rect">
@@ -23910,7 +24669,24 @@
             </a:pPr>
             <a:r>
               <a:rPr lang="en"/>
-              <a:t>POC for our website</a:t>
+              <a:t>Duplicate Note Filtering</a:t>
+            </a:r>
+            <a:endParaRPr/>
+          </a:p>
+          <a:p>
+            <a:pPr indent="-298450" lvl="1" marL="914400" rtl="0">
+              <a:spcBef>
+                <a:spcPts val="0"/>
+              </a:spcBef>
+              <a:spcAft>
+                <a:spcPts val="0"/>
+              </a:spcAft>
+              <a:buSzPts val="1100"/>
+              <a:buChar char="○"/>
+            </a:pPr>
+            <a:r>
+              <a:rPr lang="en"/>
+              <a:t>Failed and then back end database changed</a:t>
             </a:r>
             <a:endParaRPr/>
           </a:p>
@@ -23927,7 +24703,7 @@
             </a:pPr>
             <a:r>
               <a:rPr lang="en"/>
-              <a:t>Researched how to work with Github Pages</a:t>
+              <a:t>SearchManager</a:t>
             </a:r>
             <a:endParaRPr/>
           </a:p>
@@ -23944,14 +24720,64 @@
             </a:pPr>
             <a:r>
               <a:rPr lang="en"/>
-              <a:t>Researched Github flavored markdown </a:t>
+              <a:t>Issues:</a:t>
             </a:r>
             <a:endParaRPr/>
           </a:p>
           <a:p>
+            <a:pPr indent="-298450" lvl="1" marL="914400" rtl="0">
+              <a:spcBef>
+                <a:spcPts val="0"/>
+              </a:spcBef>
+              <a:spcAft>
+                <a:spcPts val="0"/>
+              </a:spcAft>
+              <a:buSzPts val="1100"/>
+              <a:buChar char="○"/>
+            </a:pPr>
+            <a:r>
+              <a:rPr lang="en"/>
+              <a:t>As a user, I want to avoid having duplicate notes - 3</a:t>
+            </a:r>
+            <a:endParaRPr/>
+          </a:p>
+          <a:p>
+            <a:pPr indent="-298450" lvl="1" marL="914400" rtl="0">
+              <a:spcBef>
+                <a:spcPts val="0"/>
+              </a:spcBef>
+              <a:spcAft>
+                <a:spcPts val="0"/>
+              </a:spcAft>
+              <a:buSzPts val="1100"/>
+              <a:buChar char="○"/>
+            </a:pPr>
+            <a:r>
+              <a:rPr lang="en"/>
+              <a:t>As a user, I want to search for notes containing word(s) - 5</a:t>
+            </a:r>
+            <a:endParaRPr/>
+          </a:p>
+          <a:p>
+            <a:pPr indent="0" lvl="0" marL="0">
+              <a:spcBef>
+                <a:spcPts val="1600"/>
+              </a:spcBef>
+              <a:spcAft>
+                <a:spcPts val="0"/>
+              </a:spcAft>
+              <a:buNone/>
+            </a:pPr>
+            <a:r>
+              <a:rPr lang="en"/>
+              <a:t>This Sprint:</a:t>
+            </a:r>
+            <a:endParaRPr/>
+          </a:p>
+          <a:p>
             <a:pPr indent="-311150" lvl="0" marL="457200" rtl="0">
               <a:spcBef>
-                <a:spcPts val="0"/>
+                <a:spcPts val="1600"/>
               </a:spcBef>
               <a:spcAft>
                 <a:spcPts val="0"/>
@@ -23960,36 +24786,15 @@
               <a:buChar char="●"/>
             </a:pPr>
             <a:r>
-              <a:rPr lang="en" u="sng">
-                <a:solidFill>
-                  <a:schemeClr val="hlink"/>
-                </a:solidFill>
-                <a:hlinkClick r:id="rId3"/>
-              </a:rPr>
-              <a:t>https://maburke.github.io/test-website/</a:t>
+              <a:rPr lang="en"/>
+              <a:t>Continuing SearchManager</a:t>
             </a:r>
             <a:endParaRPr/>
           </a:p>
           <a:p>
-            <a:pPr indent="0" lvl="0" marL="0">
-              <a:spcBef>
-                <a:spcPts val="1600"/>
-              </a:spcBef>
-              <a:spcAft>
-                <a:spcPts val="0"/>
-              </a:spcAft>
-              <a:buNone/>
-            </a:pPr>
-            <a:r>
-              <a:rPr lang="en"/>
-              <a:t>This Sprint:</a:t>
-            </a:r>
-            <a:endParaRPr/>
-          </a:p>
-          <a:p>
             <a:pPr indent="-311150" lvl="0" marL="457200" rtl="0">
               <a:spcBef>
-                <a:spcPts val="1600"/>
+                <a:spcPts val="0"/>
               </a:spcBef>
               <a:spcAft>
                 <a:spcPts val="0"/>
@@ -23999,56 +24804,29 @@
             </a:pPr>
             <a:r>
               <a:rPr lang="en"/>
-              <a:t>Help work on Privacy and Security Policies</a:t>
+              <a:t>Issues:</a:t>
             </a:r>
             <a:endParaRPr/>
           </a:p>
           <a:p>
-            <a:pPr indent="-311150" lvl="0" marL="457200">
-              <a:spcBef>
-                <a:spcPts val="0"/>
-              </a:spcBef>
-              <a:spcAft>
-                <a:spcPts val="0"/>
-              </a:spcAft>
-              <a:buSzPts val="1300"/>
-              <a:buChar char="●"/>
+            <a:pPr indent="-298450" lvl="1" marL="914400">
+              <a:spcBef>
+                <a:spcPts val="0"/>
+              </a:spcBef>
+              <a:spcAft>
+                <a:spcPts val="0"/>
+              </a:spcAft>
+              <a:buSzPts val="1100"/>
+              <a:buChar char="○"/>
             </a:pPr>
             <a:r>
               <a:rPr lang="en"/>
-              <a:t>Setting up our website for the notes app</a:t>
+              <a:t>As a user, I want to search for notes containing word(s) - 5</a:t>
             </a:r>
             <a:endParaRPr/>
           </a:p>
         </p:txBody>
       </p:sp>
-      <p:pic>
-        <p:nvPicPr>
-          <p:cNvPr id="430" name="Shape 430"/>
-          <p:cNvPicPr preferRelativeResize="0"/>
-          <p:nvPr/>
-        </p:nvPicPr>
-        <p:blipFill rotWithShape="1">
-          <a:blip r:embed="rId4">
-            <a:alphaModFix/>
-          </a:blip>
-          <a:srcRect b="5030" l="30495" r="29277" t="6246"/>
-          <a:stretch/>
-        </p:blipFill>
-        <p:spPr>
-          <a:xfrm>
-            <a:off x="5418925" y="612025"/>
-            <a:ext cx="3368626" cy="4038725"/>
-          </a:xfrm>
-          <a:prstGeom prst="rect">
-            <a:avLst/>
-          </a:prstGeom>
-          <a:noFill/>
-          <a:ln>
-            <a:noFill/>
-          </a:ln>
-        </p:spPr>
-      </p:pic>
     </p:spTree>
   </p:cSld>
   <p:clrMapOvr>
@@ -24084,7 +24862,7 @@
         </p:nvSpPr>
         <p:spPr>
           <a:xfrm>
-            <a:off x="1297500" y="380000"/>
+            <a:off x="1297500" y="393750"/>
             <a:ext cx="7038900" cy="914100"/>
           </a:xfrm>
           <a:prstGeom prst="rect">
@@ -24108,7 +24886,7 @@
             </a:pPr>
             <a:r>
               <a:rPr lang="en"/>
-              <a:t>Luke</a:t>
+              <a:t>Michael</a:t>
             </a:r>
             <a:endParaRPr/>
           </a:p>
@@ -24124,7 +24902,7 @@
         </p:nvSpPr>
         <p:spPr>
           <a:xfrm>
-            <a:off x="1297500" y="1567550"/>
+            <a:off x="1297500" y="1581300"/>
             <a:ext cx="7038900" cy="2911200"/>
           </a:xfrm>
           <a:prstGeom prst="rect">
@@ -24165,24 +24943,7 @@
             </a:pPr>
             <a:r>
               <a:rPr lang="en"/>
-              <a:t>Duplicate Note Filtering</a:t>
-            </a:r>
-            <a:endParaRPr/>
-          </a:p>
-          <a:p>
-            <a:pPr indent="-298450" lvl="1" marL="914400" rtl="0">
-              <a:spcBef>
-                <a:spcPts val="0"/>
-              </a:spcBef>
-              <a:spcAft>
-                <a:spcPts val="0"/>
-              </a:spcAft>
-              <a:buSzPts val="1100"/>
-              <a:buChar char="○"/>
-            </a:pPr>
-            <a:r>
-              <a:rPr lang="en"/>
-              <a:t>Failed and then back end database changed</a:t>
+              <a:t>POC for our website</a:t>
             </a:r>
             <a:endParaRPr/>
           </a:p>
@@ -24199,7 +24960,7 @@
             </a:pPr>
             <a:r>
               <a:rPr lang="en"/>
-              <a:t>SearchManager</a:t>
+              <a:t>Researched how to work with Github Pages</a:t>
             </a:r>
             <a:endParaRPr/>
           </a:p>
@@ -24216,41 +24977,29 @@
             </a:pPr>
             <a:r>
               <a:rPr lang="en"/>
-              <a:t>Issues:</a:t>
+              <a:t>Researched Github flavored markdown </a:t>
             </a:r>
             <a:endParaRPr/>
           </a:p>
           <a:p>
-            <a:pPr indent="-298450" lvl="1" marL="914400" rtl="0">
-              <a:spcBef>
-                <a:spcPts val="0"/>
-              </a:spcBef>
-              <a:spcAft>
-                <a:spcPts val="0"/>
-              </a:spcAft>
-              <a:buSzPts val="1100"/>
-              <a:buChar char="○"/>
-            </a:pPr>
-            <a:r>
-              <a:rPr lang="en"/>
-              <a:t>As a user, I want to avoid having duplicate notes - 3</a:t>
-            </a:r>
-            <a:endParaRPr/>
-          </a:p>
-          <a:p>
-            <a:pPr indent="-298450" lvl="1" marL="914400" rtl="0">
-              <a:spcBef>
-                <a:spcPts val="0"/>
-              </a:spcBef>
-              <a:spcAft>
-                <a:spcPts val="0"/>
-              </a:spcAft>
-              <a:buSzPts val="1100"/>
-              <a:buChar char="○"/>
-            </a:pPr>
-            <a:r>
-              <a:rPr lang="en"/>
-              <a:t>As a user, I want to search for notes containing word(s) - 5</a:t>
+            <a:pPr indent="-311150" lvl="0" marL="457200" rtl="0">
+              <a:spcBef>
+                <a:spcPts val="0"/>
+              </a:spcBef>
+              <a:spcAft>
+                <a:spcPts val="0"/>
+              </a:spcAft>
+              <a:buSzPts val="1300"/>
+              <a:buChar char="●"/>
+            </a:pPr>
+            <a:r>
+              <a:rPr lang="en" u="sng">
+                <a:solidFill>
+                  <a:schemeClr val="hlink"/>
+                </a:solidFill>
+                <a:hlinkClick r:id="rId3"/>
+              </a:rPr>
+              <a:t>https://maburke.github.io/test-website/</a:t>
             </a:r>
             <a:endParaRPr/>
           </a:p>
@@ -24283,12 +25032,12 @@
             </a:pPr>
             <a:r>
               <a:rPr lang="en"/>
-              <a:t>Continuing SearchManager</a:t>
+              <a:t>Help work on Privacy and Security Policies</a:t>
             </a:r>
             <a:endParaRPr/>
           </a:p>
           <a:p>
-            <a:pPr indent="-311150" lvl="0" marL="457200" rtl="0">
+            <a:pPr indent="-311150" lvl="0" marL="457200">
               <a:spcBef>
                 <a:spcPts val="0"/>
               </a:spcBef>
@@ -24300,29 +25049,1028 @@
             </a:pPr>
             <a:r>
               <a:rPr lang="en"/>
-              <a:t>Issues:</a:t>
-            </a:r>
-            <a:endParaRPr/>
-          </a:p>
-          <a:p>
-            <a:pPr indent="-298450" lvl="1" marL="914400">
-              <a:spcBef>
-                <a:spcPts val="0"/>
-              </a:spcBef>
-              <a:spcAft>
-                <a:spcPts val="0"/>
-              </a:spcAft>
-              <a:buSzPts val="1100"/>
-              <a:buChar char="○"/>
-            </a:pPr>
-            <a:r>
-              <a:rPr lang="en"/>
-              <a:t>As a user, I want to search for notes containing word(s) - 5</a:t>
+              <a:t>Setting up our website for the notes app</a:t>
             </a:r>
             <a:endParaRPr/>
           </a:p>
         </p:txBody>
       </p:sp>
+      <p:pic>
+        <p:nvPicPr>
+          <p:cNvPr id="437" name="Shape 437"/>
+          <p:cNvPicPr preferRelativeResize="0"/>
+          <p:nvPr/>
+        </p:nvPicPr>
+        <p:blipFill rotWithShape="1">
+          <a:blip r:embed="rId4">
+            <a:alphaModFix/>
+          </a:blip>
+          <a:srcRect b="5030" l="30495" r="29277" t="6246"/>
+          <a:stretch/>
+        </p:blipFill>
+        <p:spPr>
+          <a:xfrm>
+            <a:off x="5418925" y="612025"/>
+            <a:ext cx="3368626" cy="4038725"/>
+          </a:xfrm>
+          <a:prstGeom prst="rect">
+            <a:avLst/>
+          </a:prstGeom>
+          <a:noFill/>
+          <a:ln>
+            <a:noFill/>
+          </a:ln>
+        </p:spPr>
+      </p:pic>
+    </p:spTree>
+  </p:cSld>
+  <p:clrMapOvr>
+    <a:masterClrMapping/>
+  </p:clrMapOvr>
+</p:sld>
+</file>
+
+<file path=ppt/slides/slide45.xml><?xml version="1.0" encoding="utf-8"?>
+<p:sld xmlns:a="http://schemas.openxmlformats.org/drawingml/2006/main" xmlns:r="http://schemas.openxmlformats.org/officeDocument/2006/relationships" xmlns:mc="http://schemas.openxmlformats.org/markup-compatibility/2006" xmlns:mv="urn:schemas-microsoft-com:mac:vml" xmlns:p="http://schemas.openxmlformats.org/presentationml/2006/main" xmlns:c="http://schemas.openxmlformats.org/drawingml/2006/chart" xmlns:dgm="http://schemas.openxmlformats.org/drawingml/2006/diagram" xmlns:o="urn:schemas-microsoft-com:office:office" xmlns:v="urn:schemas-microsoft-com:vml" xmlns:pvml="urn:schemas-microsoft-com:office:powerpoint" xmlns:com="http://schemas.openxmlformats.org/drawingml/2006/compatibility" xmlns:p14="http://schemas.microsoft.com/office/powerpoint/2010/main" xmlns:p15="http://schemas.microsoft.com/office/powerpoint/2012/main">
+  <p:cSld>
+    <p:spTree>
+      <p:nvGrpSpPr>
+        <p:cNvPr id="441" name="Shape 441"/>
+        <p:cNvGrpSpPr/>
+        <p:nvPr/>
+      </p:nvGrpSpPr>
+      <p:grpSpPr>
+        <a:xfrm>
+          <a:off x="0" y="0"/>
+          <a:ext cx="0" cy="0"/>
+          <a:chOff x="0" y="0"/>
+          <a:chExt cx="0" cy="0"/>
+        </a:xfrm>
+      </p:grpSpPr>
+      <p:sp>
+        <p:nvSpPr>
+          <p:cNvPr id="442" name="Shape 442"/>
+          <p:cNvSpPr txBox="1"/>
+          <p:nvPr>
+            <p:ph type="title"/>
+          </p:nvPr>
+        </p:nvSpPr>
+        <p:spPr>
+          <a:xfrm>
+            <a:off x="702125" y="3815225"/>
+            <a:ext cx="5391900" cy="804900"/>
+          </a:xfrm>
+          <a:prstGeom prst="rect">
+            <a:avLst/>
+          </a:prstGeom>
+        </p:spPr>
+        <p:txBody>
+          <a:bodyPr anchorCtr="0" anchor="ctr" bIns="91425" lIns="91425" spcFirstLastPara="1" rIns="91425" wrap="square" tIns="91425">
+            <a:noAutofit/>
+          </a:bodyPr>
+          <a:lstStyle/>
+          <a:p>
+            <a:pPr indent="0" lvl="0" marL="0" rtl="0">
+              <a:spcBef>
+                <a:spcPts val="0"/>
+              </a:spcBef>
+              <a:spcAft>
+                <a:spcPts val="0"/>
+              </a:spcAft>
+              <a:buNone/>
+            </a:pPr>
+            <a:r>
+              <a:rPr lang="en" sz="2400"/>
+              <a:t>Server Under the Mountain (SUM)</a:t>
+            </a:r>
+            <a:endParaRPr sz="2400"/>
+          </a:p>
+        </p:txBody>
+      </p:sp>
+      <p:pic>
+        <p:nvPicPr>
+          <p:cNvPr id="443" name="Shape 443"/>
+          <p:cNvPicPr preferRelativeResize="0"/>
+          <p:nvPr/>
+        </p:nvPicPr>
+        <p:blipFill rotWithShape="1">
+          <a:blip r:embed="rId3">
+            <a:alphaModFix/>
+          </a:blip>
+          <a:srcRect b="-12574" l="-5652" r="0" t="0"/>
+          <a:stretch/>
+        </p:blipFill>
+        <p:spPr>
+          <a:xfrm>
+            <a:off x="1467625" y="391838"/>
+            <a:ext cx="3662375" cy="3902625"/>
+          </a:xfrm>
+          <a:prstGeom prst="rect">
+            <a:avLst/>
+          </a:prstGeom>
+          <a:noFill/>
+          <a:ln>
+            <a:noFill/>
+          </a:ln>
+        </p:spPr>
+      </p:pic>
+      <p:sp>
+        <p:nvSpPr>
+          <p:cNvPr id="444" name="Shape 444"/>
+          <p:cNvSpPr txBox="1"/>
+          <p:nvPr>
+            <p:ph type="title"/>
+          </p:nvPr>
+        </p:nvSpPr>
+        <p:spPr>
+          <a:xfrm>
+            <a:off x="2183125" y="4438200"/>
+            <a:ext cx="3005700" cy="705300"/>
+          </a:xfrm>
+          <a:prstGeom prst="rect">
+            <a:avLst/>
+          </a:prstGeom>
+        </p:spPr>
+        <p:txBody>
+          <a:bodyPr anchorCtr="0" anchor="ctr" bIns="91425" lIns="91425" spcFirstLastPara="1" rIns="91425" wrap="square" tIns="91425">
+            <a:noAutofit/>
+          </a:bodyPr>
+          <a:lstStyle/>
+          <a:p>
+            <a:pPr indent="0" lvl="0" marL="0" rtl="0">
+              <a:spcBef>
+                <a:spcPts val="0"/>
+              </a:spcBef>
+              <a:spcAft>
+                <a:spcPts val="0"/>
+              </a:spcAft>
+              <a:buNone/>
+            </a:pPr>
+            <a:r>
+              <a:rPr lang="en" sz="2000"/>
+              <a:t>Scrum Report</a:t>
+            </a:r>
+            <a:r>
+              <a:rPr lang="en" sz="2000"/>
+              <a:t> </a:t>
+            </a:r>
+            <a:r>
+              <a:rPr lang="en" sz="2000"/>
+              <a:t>3/26</a:t>
+            </a:r>
+            <a:endParaRPr sz="2000"/>
+          </a:p>
+        </p:txBody>
+      </p:sp>
+    </p:spTree>
+  </p:cSld>
+  <p:clrMapOvr>
+    <a:masterClrMapping/>
+  </p:clrMapOvr>
+</p:sld>
+</file>
+
+<file path=ppt/slides/slide46.xml><?xml version="1.0" encoding="utf-8"?>
+<p:sld xmlns:a="http://schemas.openxmlformats.org/drawingml/2006/main" xmlns:r="http://schemas.openxmlformats.org/officeDocument/2006/relationships" xmlns:mc="http://schemas.openxmlformats.org/markup-compatibility/2006" xmlns:mv="urn:schemas-microsoft-com:mac:vml" xmlns:p="http://schemas.openxmlformats.org/presentationml/2006/main" xmlns:c="http://schemas.openxmlformats.org/drawingml/2006/chart" xmlns:dgm="http://schemas.openxmlformats.org/drawingml/2006/diagram" xmlns:o="urn:schemas-microsoft-com:office:office" xmlns:v="urn:schemas-microsoft-com:vml" xmlns:pvml="urn:schemas-microsoft-com:office:powerpoint" xmlns:com="http://schemas.openxmlformats.org/drawingml/2006/compatibility" xmlns:p14="http://schemas.microsoft.com/office/powerpoint/2010/main" xmlns:p15="http://schemas.microsoft.com/office/powerpoint/2012/main">
+  <p:cSld>
+    <p:spTree>
+      <p:nvGrpSpPr>
+        <p:cNvPr id="448" name="Shape 448"/>
+        <p:cNvGrpSpPr/>
+        <p:nvPr/>
+      </p:nvGrpSpPr>
+      <p:grpSpPr>
+        <a:xfrm>
+          <a:off x="0" y="0"/>
+          <a:ext cx="0" cy="0"/>
+          <a:chOff x="0" y="0"/>
+          <a:chExt cx="0" cy="0"/>
+        </a:xfrm>
+      </p:grpSpPr>
+      <p:pic>
+        <p:nvPicPr>
+          <p:cNvPr id="449" name="Shape 449"/>
+          <p:cNvPicPr preferRelativeResize="0"/>
+          <p:nvPr/>
+        </p:nvPicPr>
+        <p:blipFill>
+          <a:blip r:embed="rId3">
+            <a:alphaModFix/>
+          </a:blip>
+          <a:stretch>
+            <a:fillRect/>
+          </a:stretch>
+        </p:blipFill>
+        <p:spPr>
+          <a:xfrm>
+            <a:off x="152400" y="152400"/>
+            <a:ext cx="8745838" cy="4838701"/>
+          </a:xfrm>
+          <a:prstGeom prst="rect">
+            <a:avLst/>
+          </a:prstGeom>
+          <a:noFill/>
+          <a:ln>
+            <a:noFill/>
+          </a:ln>
+        </p:spPr>
+      </p:pic>
+    </p:spTree>
+  </p:cSld>
+  <p:clrMapOvr>
+    <a:masterClrMapping/>
+  </p:clrMapOvr>
+</p:sld>
+</file>
+
+<file path=ppt/slides/slide47.xml><?xml version="1.0" encoding="utf-8"?>
+<p:sld xmlns:a="http://schemas.openxmlformats.org/drawingml/2006/main" xmlns:r="http://schemas.openxmlformats.org/officeDocument/2006/relationships" xmlns:mc="http://schemas.openxmlformats.org/markup-compatibility/2006" xmlns:mv="urn:schemas-microsoft-com:mac:vml" xmlns:p="http://schemas.openxmlformats.org/presentationml/2006/main" xmlns:c="http://schemas.openxmlformats.org/drawingml/2006/chart" xmlns:dgm="http://schemas.openxmlformats.org/drawingml/2006/diagram" xmlns:o="urn:schemas-microsoft-com:office:office" xmlns:v="urn:schemas-microsoft-com:vml" xmlns:pvml="urn:schemas-microsoft-com:office:powerpoint" xmlns:com="http://schemas.openxmlformats.org/drawingml/2006/compatibility" xmlns:p14="http://schemas.microsoft.com/office/powerpoint/2010/main" xmlns:p15="http://schemas.microsoft.com/office/powerpoint/2012/main">
+  <p:cSld>
+    <p:spTree>
+      <p:nvGrpSpPr>
+        <p:cNvPr id="453" name="Shape 453"/>
+        <p:cNvGrpSpPr/>
+        <p:nvPr/>
+      </p:nvGrpSpPr>
+      <p:grpSpPr>
+        <a:xfrm>
+          <a:off x="0" y="0"/>
+          <a:ext cx="0" cy="0"/>
+          <a:chOff x="0" y="0"/>
+          <a:chExt cx="0" cy="0"/>
+        </a:xfrm>
+      </p:grpSpPr>
+      <p:sp>
+        <p:nvSpPr>
+          <p:cNvPr id="454" name="Shape 454"/>
+          <p:cNvSpPr txBox="1"/>
+          <p:nvPr>
+            <p:ph type="title"/>
+          </p:nvPr>
+        </p:nvSpPr>
+        <p:spPr>
+          <a:xfrm>
+            <a:off x="1297500" y="393750"/>
+            <a:ext cx="7038900" cy="914100"/>
+          </a:xfrm>
+          <a:prstGeom prst="rect">
+            <a:avLst/>
+          </a:prstGeom>
+        </p:spPr>
+        <p:txBody>
+          <a:bodyPr anchorCtr="0" anchor="t" bIns="91425" lIns="91425" spcFirstLastPara="1" rIns="91425" wrap="square" tIns="91425">
+            <a:noAutofit/>
+          </a:bodyPr>
+          <a:lstStyle/>
+          <a:p>
+            <a:pPr indent="0" lvl="0" marL="0" rtl="0">
+              <a:spcBef>
+                <a:spcPts val="0"/>
+              </a:spcBef>
+              <a:spcAft>
+                <a:spcPts val="0"/>
+              </a:spcAft>
+              <a:buNone/>
+            </a:pPr>
+            <a:r>
+              <a:t/>
+            </a:r>
+            <a:endParaRPr/>
+          </a:p>
+          <a:p>
+            <a:pPr indent="0" lvl="0" marL="0" rtl="0">
+              <a:spcBef>
+                <a:spcPts val="0"/>
+              </a:spcBef>
+              <a:spcAft>
+                <a:spcPts val="0"/>
+              </a:spcAft>
+              <a:buNone/>
+            </a:pPr>
+            <a:r>
+              <a:rPr lang="en"/>
+              <a:t>Alex</a:t>
+            </a:r>
+            <a:endParaRPr/>
+          </a:p>
+        </p:txBody>
+      </p:sp>
+      <p:sp>
+        <p:nvSpPr>
+          <p:cNvPr id="455" name="Shape 455"/>
+          <p:cNvSpPr txBox="1"/>
+          <p:nvPr>
+            <p:ph idx="1" type="body"/>
+          </p:nvPr>
+        </p:nvSpPr>
+        <p:spPr>
+          <a:xfrm>
+            <a:off x="1297500" y="1567550"/>
+            <a:ext cx="7038900" cy="3077400"/>
+          </a:xfrm>
+          <a:prstGeom prst="rect">
+            <a:avLst/>
+          </a:prstGeom>
+        </p:spPr>
+        <p:txBody>
+          <a:bodyPr anchorCtr="0" anchor="t" bIns="91425" lIns="91425" spcFirstLastPara="1" rIns="91425" wrap="square" tIns="91425">
+            <a:noAutofit/>
+          </a:bodyPr>
+          <a:lstStyle/>
+          <a:p>
+            <a:pPr indent="0" lvl="0" marL="0" rtl="0">
+              <a:spcBef>
+                <a:spcPts val="0"/>
+              </a:spcBef>
+              <a:spcAft>
+                <a:spcPts val="0"/>
+              </a:spcAft>
+              <a:buNone/>
+            </a:pPr>
+            <a:r>
+              <a:rPr lang="en" sz="1400"/>
+              <a:t>Worked on:</a:t>
+            </a:r>
+            <a:endParaRPr sz="1400"/>
+          </a:p>
+          <a:p>
+            <a:pPr indent="-317500" lvl="0" marL="457200" marR="0" rtl="0" algn="l">
+              <a:lnSpc>
+                <a:spcPct val="115000"/>
+              </a:lnSpc>
+              <a:spcBef>
+                <a:spcPts val="1600"/>
+              </a:spcBef>
+              <a:spcAft>
+                <a:spcPts val="0"/>
+              </a:spcAft>
+              <a:buClr>
+                <a:schemeClr val="lt1"/>
+              </a:buClr>
+              <a:buSzPts val="1400"/>
+              <a:buFont typeface="Lato"/>
+              <a:buChar char="●"/>
+            </a:pPr>
+            <a:r>
+              <a:rPr lang="en" sz="1400"/>
+              <a:t>Import/Export Subsystem</a:t>
+            </a:r>
+            <a:endParaRPr sz="1400"/>
+          </a:p>
+          <a:p>
+            <a:pPr indent="-317500" lvl="1" marL="914400" rtl="0">
+              <a:spcBef>
+                <a:spcPts val="0"/>
+              </a:spcBef>
+              <a:spcAft>
+                <a:spcPts val="0"/>
+              </a:spcAft>
+              <a:buSzPts val="1400"/>
+              <a:buChar char="○"/>
+            </a:pPr>
+            <a:r>
+              <a:rPr lang="en" sz="1400"/>
+              <a:t>Issue #15: As a user I want to backup my notes (7 points)</a:t>
+            </a:r>
+            <a:endParaRPr sz="1400"/>
+          </a:p>
+          <a:p>
+            <a:pPr indent="-317500" lvl="2" marL="1371600" marR="0" rtl="0" algn="l">
+              <a:lnSpc>
+                <a:spcPct val="115000"/>
+              </a:lnSpc>
+              <a:spcBef>
+                <a:spcPts val="0"/>
+              </a:spcBef>
+              <a:spcAft>
+                <a:spcPts val="0"/>
+              </a:spcAft>
+              <a:buSzPts val="1400"/>
+              <a:buChar char="■"/>
+            </a:pPr>
+            <a:r>
+              <a:rPr lang="en" sz="1400"/>
+              <a:t>Continued work on cloud sync</a:t>
+            </a:r>
+            <a:endParaRPr sz="1400"/>
+          </a:p>
+          <a:p>
+            <a:pPr indent="-317500" lvl="2" marL="1371600" marR="0" rtl="0" algn="l">
+              <a:lnSpc>
+                <a:spcPct val="115000"/>
+              </a:lnSpc>
+              <a:spcBef>
+                <a:spcPts val="0"/>
+              </a:spcBef>
+              <a:spcAft>
+                <a:spcPts val="0"/>
+              </a:spcAft>
+              <a:buSzPts val="1400"/>
+              <a:buChar char="■"/>
+            </a:pPr>
+            <a:r>
+              <a:rPr lang="en" sz="1400"/>
+              <a:t>The app is able to initiate the Intent to share content</a:t>
+            </a:r>
+            <a:endParaRPr sz="1400"/>
+          </a:p>
+          <a:p>
+            <a:pPr indent="-317500" lvl="2" marL="1371600" marR="0" rtl="0" algn="l">
+              <a:lnSpc>
+                <a:spcPct val="115000"/>
+              </a:lnSpc>
+              <a:spcBef>
+                <a:spcPts val="0"/>
+              </a:spcBef>
+              <a:spcAft>
+                <a:spcPts val="0"/>
+              </a:spcAft>
+              <a:buSzPts val="1400"/>
+              <a:buChar char="■"/>
+            </a:pPr>
+            <a:r>
+              <a:rPr lang="en" sz="1400"/>
+              <a:t>BUT, the receiving end is not receiving properly</a:t>
+            </a:r>
+            <a:endParaRPr sz="1400"/>
+          </a:p>
+          <a:p>
+            <a:pPr indent="-317500" lvl="3" marL="1828800" marR="0" rtl="0" algn="l">
+              <a:lnSpc>
+                <a:spcPct val="115000"/>
+              </a:lnSpc>
+              <a:spcBef>
+                <a:spcPts val="0"/>
+              </a:spcBef>
+              <a:spcAft>
+                <a:spcPts val="0"/>
+              </a:spcAft>
+              <a:buSzPts val="1400"/>
+              <a:buChar char="●"/>
+            </a:pPr>
+            <a:r>
+              <a:rPr lang="en" sz="1400"/>
+              <a:t>We </a:t>
+            </a:r>
+            <a:r>
+              <a:rPr i="1" lang="en" sz="1400"/>
+              <a:t>may </a:t>
+            </a:r>
+            <a:r>
+              <a:rPr lang="en" sz="1400"/>
+              <a:t>have to switch to using the Dropbox Core API</a:t>
+            </a:r>
+            <a:endParaRPr sz="1400"/>
+          </a:p>
+          <a:p>
+            <a:pPr indent="0" lvl="0" marL="0" rtl="0">
+              <a:spcBef>
+                <a:spcPts val="1600"/>
+              </a:spcBef>
+              <a:spcAft>
+                <a:spcPts val="0"/>
+              </a:spcAft>
+              <a:buNone/>
+            </a:pPr>
+            <a:r>
+              <a:rPr lang="en" sz="1400"/>
+              <a:t>This Sprint:</a:t>
+            </a:r>
+            <a:endParaRPr sz="1400"/>
+          </a:p>
+          <a:p>
+            <a:pPr indent="-317500" lvl="0" marL="457200" marR="0" rtl="0" algn="l">
+              <a:lnSpc>
+                <a:spcPct val="115000"/>
+              </a:lnSpc>
+              <a:spcBef>
+                <a:spcPts val="1600"/>
+              </a:spcBef>
+              <a:spcAft>
+                <a:spcPts val="0"/>
+              </a:spcAft>
+              <a:buClr>
+                <a:schemeClr val="lt1"/>
+              </a:buClr>
+              <a:buSzPts val="1400"/>
+              <a:buFont typeface="Lato"/>
+              <a:buChar char="●"/>
+            </a:pPr>
+            <a:r>
+              <a:rPr lang="en" sz="1400"/>
+              <a:t>Finish cloud sync functionality</a:t>
+            </a:r>
+            <a:endParaRPr sz="1400"/>
+          </a:p>
+        </p:txBody>
+      </p:sp>
+    </p:spTree>
+  </p:cSld>
+  <p:clrMapOvr>
+    <a:masterClrMapping/>
+  </p:clrMapOvr>
+</p:sld>
+</file>
+
+<file path=ppt/slides/slide48.xml><?xml version="1.0" encoding="utf-8"?>
+<p:sld xmlns:a="http://schemas.openxmlformats.org/drawingml/2006/main" xmlns:r="http://schemas.openxmlformats.org/officeDocument/2006/relationships" xmlns:mc="http://schemas.openxmlformats.org/markup-compatibility/2006" xmlns:mv="urn:schemas-microsoft-com:mac:vml" xmlns:p="http://schemas.openxmlformats.org/presentationml/2006/main" xmlns:c="http://schemas.openxmlformats.org/drawingml/2006/chart" xmlns:dgm="http://schemas.openxmlformats.org/drawingml/2006/diagram" xmlns:o="urn:schemas-microsoft-com:office:office" xmlns:v="urn:schemas-microsoft-com:vml" xmlns:pvml="urn:schemas-microsoft-com:office:powerpoint" xmlns:com="http://schemas.openxmlformats.org/drawingml/2006/compatibility" xmlns:p14="http://schemas.microsoft.com/office/powerpoint/2010/main" xmlns:p15="http://schemas.microsoft.com/office/powerpoint/2012/main">
+  <p:cSld>
+    <p:spTree>
+      <p:nvGrpSpPr>
+        <p:cNvPr id="459" name="Shape 459"/>
+        <p:cNvGrpSpPr/>
+        <p:nvPr/>
+      </p:nvGrpSpPr>
+      <p:grpSpPr>
+        <a:xfrm>
+          <a:off x="0" y="0"/>
+          <a:ext cx="0" cy="0"/>
+          <a:chOff x="0" y="0"/>
+          <a:chExt cx="0" cy="0"/>
+        </a:xfrm>
+      </p:grpSpPr>
+      <p:sp>
+        <p:nvSpPr>
+          <p:cNvPr id="460" name="Shape 460"/>
+          <p:cNvSpPr txBox="1"/>
+          <p:nvPr>
+            <p:ph type="title"/>
+          </p:nvPr>
+        </p:nvSpPr>
+        <p:spPr>
+          <a:xfrm>
+            <a:off x="1297500" y="679150"/>
+            <a:ext cx="4642800" cy="628800"/>
+          </a:xfrm>
+          <a:prstGeom prst="rect">
+            <a:avLst/>
+          </a:prstGeom>
+        </p:spPr>
+        <p:txBody>
+          <a:bodyPr anchorCtr="0" anchor="t" bIns="91425" lIns="91425" spcFirstLastPara="1" rIns="91425" wrap="square" tIns="91425">
+            <a:noAutofit/>
+          </a:bodyPr>
+          <a:lstStyle/>
+          <a:p>
+            <a:pPr indent="0" lvl="0" marL="0" rtl="0">
+              <a:spcBef>
+                <a:spcPts val="0"/>
+              </a:spcBef>
+              <a:spcAft>
+                <a:spcPts val="0"/>
+              </a:spcAft>
+              <a:buNone/>
+            </a:pPr>
+            <a:r>
+              <a:rPr lang="en" sz="3000"/>
+              <a:t>Collin</a:t>
+            </a:r>
+            <a:endParaRPr sz="3000"/>
+          </a:p>
+        </p:txBody>
+      </p:sp>
+      <p:sp>
+        <p:nvSpPr>
+          <p:cNvPr id="461" name="Shape 461"/>
+          <p:cNvSpPr txBox="1"/>
+          <p:nvPr>
+            <p:ph idx="1" type="body"/>
+          </p:nvPr>
+        </p:nvSpPr>
+        <p:spPr>
+          <a:xfrm>
+            <a:off x="1297500" y="1476050"/>
+            <a:ext cx="7205700" cy="3350400"/>
+          </a:xfrm>
+          <a:prstGeom prst="rect">
+            <a:avLst/>
+          </a:prstGeom>
+        </p:spPr>
+        <p:txBody>
+          <a:bodyPr anchorCtr="0" anchor="t" bIns="91425" lIns="91425" spcFirstLastPara="1" rIns="91425" wrap="square" tIns="91425">
+            <a:noAutofit/>
+          </a:bodyPr>
+          <a:lstStyle/>
+          <a:p>
+            <a:pPr indent="0" lvl="0" marL="0" rtl="0">
+              <a:spcBef>
+                <a:spcPts val="0"/>
+              </a:spcBef>
+              <a:spcAft>
+                <a:spcPts val="0"/>
+              </a:spcAft>
+              <a:buNone/>
+            </a:pPr>
+            <a:r>
+              <a:rPr b="1" lang="en"/>
+              <a:t>Worked On</a:t>
+            </a:r>
+            <a:endParaRPr b="1"/>
+          </a:p>
+          <a:p>
+            <a:pPr indent="-311150" lvl="0" marL="457200" rtl="0">
+              <a:spcBef>
+                <a:spcPts val="1600"/>
+              </a:spcBef>
+              <a:spcAft>
+                <a:spcPts val="0"/>
+              </a:spcAft>
+              <a:buSzPts val="1300"/>
+              <a:buChar char="●"/>
+            </a:pPr>
+            <a:r>
+              <a:rPr lang="en"/>
+              <a:t>Use a YubiKey NEO as a hardware authentication method (5)</a:t>
+            </a:r>
+            <a:endParaRPr/>
+          </a:p>
+          <a:p>
+            <a:pPr indent="-311150" lvl="0" marL="457200" rtl="0">
+              <a:spcBef>
+                <a:spcPts val="0"/>
+              </a:spcBef>
+              <a:spcAft>
+                <a:spcPts val="0"/>
+              </a:spcAft>
+              <a:buSzPts val="1300"/>
+              <a:buChar char="●"/>
+            </a:pPr>
+            <a:r>
+              <a:rPr lang="en"/>
+              <a:t>Password generated on startup (3)</a:t>
+            </a:r>
+            <a:endParaRPr/>
+          </a:p>
+          <a:p>
+            <a:pPr indent="-311150" lvl="0" marL="457200" rtl="0">
+              <a:spcBef>
+                <a:spcPts val="0"/>
+              </a:spcBef>
+              <a:spcAft>
+                <a:spcPts val="0"/>
+              </a:spcAft>
+              <a:buSzPts val="1300"/>
+              <a:buChar char="●"/>
+            </a:pPr>
+            <a:r>
+              <a:rPr lang="en"/>
+              <a:t>Ability to change password (3)</a:t>
+            </a:r>
+            <a:endParaRPr/>
+          </a:p>
+          <a:p>
+            <a:pPr indent="-311150" lvl="0" marL="457200" rtl="0">
+              <a:spcBef>
+                <a:spcPts val="0"/>
+              </a:spcBef>
+              <a:spcAft>
+                <a:spcPts val="0"/>
+              </a:spcAft>
+              <a:buSzPts val="1300"/>
+              <a:buChar char="●"/>
+            </a:pPr>
+            <a:r>
+              <a:rPr lang="en"/>
+              <a:t>Front end for search input (3)</a:t>
+            </a:r>
+            <a:endParaRPr/>
+          </a:p>
+          <a:p>
+            <a:pPr indent="0" lvl="0" marL="0" rtl="0">
+              <a:spcBef>
+                <a:spcPts val="1600"/>
+              </a:spcBef>
+              <a:spcAft>
+                <a:spcPts val="0"/>
+              </a:spcAft>
+              <a:buNone/>
+            </a:pPr>
+            <a:r>
+              <a:rPr b="1" lang="en"/>
+              <a:t>This Sprint</a:t>
+            </a:r>
+            <a:endParaRPr b="1"/>
+          </a:p>
+          <a:p>
+            <a:pPr indent="-311150" lvl="0" marL="457200" rtl="0">
+              <a:spcBef>
+                <a:spcPts val="1600"/>
+              </a:spcBef>
+              <a:spcAft>
+                <a:spcPts val="0"/>
+              </a:spcAft>
+              <a:buSzPts val="1300"/>
+              <a:buChar char="●"/>
+            </a:pPr>
+            <a:r>
+              <a:rPr lang="en"/>
+              <a:t>UI picker for authentication methods</a:t>
+            </a:r>
+            <a:endParaRPr/>
+          </a:p>
+          <a:p>
+            <a:pPr indent="-311150" lvl="0" marL="457200" rtl="0">
+              <a:spcBef>
+                <a:spcPts val="0"/>
+              </a:spcBef>
+              <a:spcAft>
+                <a:spcPts val="0"/>
+              </a:spcAft>
+              <a:buSzPts val="1300"/>
+              <a:buChar char="●"/>
+            </a:pPr>
+            <a:r>
+              <a:rPr lang="en"/>
+              <a:t>Ability to restore notes from a backup</a:t>
+            </a:r>
+            <a:endParaRPr/>
+          </a:p>
+        </p:txBody>
+      </p:sp>
+    </p:spTree>
+  </p:cSld>
+  <p:clrMapOvr>
+    <a:masterClrMapping/>
+  </p:clrMapOvr>
+</p:sld>
+</file>
+
+<file path=ppt/slides/slide49.xml><?xml version="1.0" encoding="utf-8"?>
+<p:sld xmlns:a="http://schemas.openxmlformats.org/drawingml/2006/main" xmlns:r="http://schemas.openxmlformats.org/officeDocument/2006/relationships" xmlns:mc="http://schemas.openxmlformats.org/markup-compatibility/2006" xmlns:mv="urn:schemas-microsoft-com:mac:vml" xmlns:p="http://schemas.openxmlformats.org/presentationml/2006/main" xmlns:c="http://schemas.openxmlformats.org/drawingml/2006/chart" xmlns:dgm="http://schemas.openxmlformats.org/drawingml/2006/diagram" xmlns:o="urn:schemas-microsoft-com:office:office" xmlns:v="urn:schemas-microsoft-com:vml" xmlns:pvml="urn:schemas-microsoft-com:office:powerpoint" xmlns:com="http://schemas.openxmlformats.org/drawingml/2006/compatibility" xmlns:p14="http://schemas.microsoft.com/office/powerpoint/2010/main" xmlns:p15="http://schemas.microsoft.com/office/powerpoint/2012/main">
+  <p:cSld>
+    <p:spTree>
+      <p:nvGrpSpPr>
+        <p:cNvPr id="465" name="Shape 465"/>
+        <p:cNvGrpSpPr/>
+        <p:nvPr/>
+      </p:nvGrpSpPr>
+      <p:grpSpPr>
+        <a:xfrm>
+          <a:off x="0" y="0"/>
+          <a:ext cx="0" cy="0"/>
+          <a:chOff x="0" y="0"/>
+          <a:chExt cx="0" cy="0"/>
+        </a:xfrm>
+      </p:grpSpPr>
+      <p:sp>
+        <p:nvSpPr>
+          <p:cNvPr id="466" name="Shape 466"/>
+          <p:cNvSpPr txBox="1"/>
+          <p:nvPr>
+            <p:ph type="title"/>
+          </p:nvPr>
+        </p:nvSpPr>
+        <p:spPr>
+          <a:xfrm>
+            <a:off x="1297500" y="588600"/>
+            <a:ext cx="7038900" cy="719400"/>
+          </a:xfrm>
+          <a:prstGeom prst="rect">
+            <a:avLst/>
+          </a:prstGeom>
+        </p:spPr>
+        <p:txBody>
+          <a:bodyPr anchorCtr="0" anchor="t" bIns="91425" lIns="91425" spcFirstLastPara="1" rIns="91425" wrap="square" tIns="91425">
+            <a:noAutofit/>
+          </a:bodyPr>
+          <a:lstStyle/>
+          <a:p>
+            <a:pPr indent="0" lvl="0" marL="0" rtl="0">
+              <a:spcBef>
+                <a:spcPts val="0"/>
+              </a:spcBef>
+              <a:spcAft>
+                <a:spcPts val="0"/>
+              </a:spcAft>
+              <a:buNone/>
+            </a:pPr>
+            <a:r>
+              <a:rPr lang="en"/>
+              <a:t>Jessica</a:t>
+            </a:r>
+            <a:endParaRPr/>
+          </a:p>
+        </p:txBody>
+      </p:sp>
+      <p:sp>
+        <p:nvSpPr>
+          <p:cNvPr id="467" name="Shape 467"/>
+          <p:cNvSpPr txBox="1"/>
+          <p:nvPr>
+            <p:ph idx="1" type="body"/>
+          </p:nvPr>
+        </p:nvSpPr>
+        <p:spPr>
+          <a:xfrm>
+            <a:off x="1297500" y="1567550"/>
+            <a:ext cx="7038900" cy="2911200"/>
+          </a:xfrm>
+          <a:prstGeom prst="rect">
+            <a:avLst/>
+          </a:prstGeom>
+        </p:spPr>
+        <p:txBody>
+          <a:bodyPr anchorCtr="0" anchor="t" bIns="91425" lIns="91425" spcFirstLastPara="1" rIns="91425" wrap="square" tIns="91425">
+            <a:noAutofit/>
+          </a:bodyPr>
+          <a:lstStyle/>
+          <a:p>
+            <a:pPr indent="0" lvl="0" marL="0" rtl="0">
+              <a:spcBef>
+                <a:spcPts val="0"/>
+              </a:spcBef>
+              <a:spcAft>
+                <a:spcPts val="0"/>
+              </a:spcAft>
+              <a:buNone/>
+            </a:pPr>
+            <a:r>
+              <a:rPr lang="en"/>
+              <a:t>Worked on:</a:t>
+            </a:r>
+            <a:endParaRPr/>
+          </a:p>
+          <a:p>
+            <a:pPr indent="-311150" lvl="0" marL="457200" rtl="0">
+              <a:spcBef>
+                <a:spcPts val="1600"/>
+              </a:spcBef>
+              <a:spcAft>
+                <a:spcPts val="0"/>
+              </a:spcAft>
+              <a:buSzPts val="1300"/>
+              <a:buChar char="●"/>
+            </a:pPr>
+            <a:r>
+              <a:rPr lang="en"/>
+              <a:t>Continued Work on User Security Policy</a:t>
+            </a:r>
+            <a:endParaRPr/>
+          </a:p>
+          <a:p>
+            <a:pPr indent="-311150" lvl="0" marL="457200" rtl="0">
+              <a:spcBef>
+                <a:spcPts val="0"/>
+              </a:spcBef>
+              <a:spcAft>
+                <a:spcPts val="0"/>
+              </a:spcAft>
+              <a:buSzPts val="1300"/>
+              <a:buChar char="●"/>
+            </a:pPr>
+            <a:r>
+              <a:rPr lang="en"/>
+              <a:t>Terms of Service</a:t>
+            </a:r>
+            <a:endParaRPr/>
+          </a:p>
+          <a:p>
+            <a:pPr indent="-311150" lvl="0" marL="457200" rtl="0">
+              <a:spcBef>
+                <a:spcPts val="0"/>
+              </a:spcBef>
+              <a:spcAft>
+                <a:spcPts val="0"/>
+              </a:spcAft>
+              <a:buSzPts val="1300"/>
+              <a:buChar char="●"/>
+            </a:pPr>
+            <a:r>
+              <a:rPr lang="en"/>
+              <a:t>Privacy Policy</a:t>
+            </a:r>
+            <a:endParaRPr/>
+          </a:p>
+          <a:p>
+            <a:pPr indent="0" lvl="0" marL="0" rtl="0">
+              <a:spcBef>
+                <a:spcPts val="1600"/>
+              </a:spcBef>
+              <a:spcAft>
+                <a:spcPts val="0"/>
+              </a:spcAft>
+              <a:buNone/>
+            </a:pPr>
+            <a:r>
+              <a:rPr lang="en"/>
+              <a:t>Issues:</a:t>
+            </a:r>
+            <a:endParaRPr/>
+          </a:p>
+          <a:p>
+            <a:pPr indent="-311150" lvl="0" marL="457200" rtl="0">
+              <a:spcBef>
+                <a:spcPts val="1600"/>
+              </a:spcBef>
+              <a:spcAft>
+                <a:spcPts val="0"/>
+              </a:spcAft>
+              <a:buSzPts val="1300"/>
+              <a:buChar char="●"/>
+            </a:pPr>
+            <a:r>
+              <a:rPr lang="en"/>
+              <a:t>As a user I want to understand the privacy and security policies before I install the app(5)</a:t>
+            </a:r>
+            <a:endParaRPr/>
+          </a:p>
+          <a:p>
+            <a:pPr indent="0" lvl="0" marL="0" rtl="0">
+              <a:spcBef>
+                <a:spcPts val="1600"/>
+              </a:spcBef>
+              <a:spcAft>
+                <a:spcPts val="0"/>
+              </a:spcAft>
+              <a:buNone/>
+            </a:pPr>
+            <a:r>
+              <a:rPr lang="en"/>
+              <a:t>This Sprint:</a:t>
+            </a:r>
+            <a:endParaRPr/>
+          </a:p>
+          <a:p>
+            <a:pPr indent="-311150" lvl="0" marL="457200" rtl="0">
+              <a:spcBef>
+                <a:spcPts val="1600"/>
+              </a:spcBef>
+              <a:spcAft>
+                <a:spcPts val="0"/>
+              </a:spcAft>
+              <a:buSzPts val="1300"/>
+              <a:buChar char="●"/>
+            </a:pPr>
+            <a:r>
+              <a:rPr lang="en"/>
+              <a:t>Researching and implementing a biometric option for decryption(5)</a:t>
+            </a:r>
+            <a:endParaRPr/>
+          </a:p>
+          <a:p>
+            <a:pPr indent="-311150" lvl="0" marL="457200" rtl="0">
+              <a:spcBef>
+                <a:spcPts val="0"/>
+              </a:spcBef>
+              <a:spcAft>
+                <a:spcPts val="0"/>
+              </a:spcAft>
+              <a:buSzPts val="1300"/>
+              <a:buChar char="●"/>
+            </a:pPr>
+            <a:r>
+              <a:rPr lang="en"/>
+              <a:t>Finishing security documentation </a:t>
+            </a:r>
+            <a:endParaRPr/>
+          </a:p>
+          <a:p>
+            <a:pPr indent="-311150" lvl="0" marL="457200" rtl="0">
+              <a:spcBef>
+                <a:spcPts val="0"/>
+              </a:spcBef>
+              <a:spcAft>
+                <a:spcPts val="0"/>
+              </a:spcAft>
+              <a:buSzPts val="1300"/>
+              <a:buChar char="●"/>
+            </a:pPr>
+            <a:r>
+              <a:rPr lang="en"/>
+              <a:t>User Manual </a:t>
+            </a:r>
+            <a:endParaRPr/>
+          </a:p>
+        </p:txBody>
+      </p:sp>
+      <p:pic>
+        <p:nvPicPr>
+          <p:cNvPr id="468" name="Shape 468"/>
+          <p:cNvPicPr preferRelativeResize="0"/>
+          <p:nvPr/>
+        </p:nvPicPr>
+        <p:blipFill>
+          <a:blip r:embed="rId3">
+            <a:alphaModFix/>
+          </a:blip>
+          <a:stretch>
+            <a:fillRect/>
+          </a:stretch>
+        </p:blipFill>
+        <p:spPr>
+          <a:xfrm>
+            <a:off x="5399701" y="357700"/>
+            <a:ext cx="2622700" cy="2671276"/>
+          </a:xfrm>
+          <a:prstGeom prst="rect">
+            <a:avLst/>
+          </a:prstGeom>
+          <a:noFill/>
+          <a:ln>
+            <a:noFill/>
+          </a:ln>
+        </p:spPr>
+      </p:pic>
     </p:spTree>
   </p:cSld>
   <p:clrMapOvr>
@@ -24565,6 +26313,463 @@
               <a:t>Use #Hashtags, words, or phrases to find a note.</a:t>
             </a:r>
             <a:endParaRPr sz="1400"/>
+          </a:p>
+        </p:txBody>
+      </p:sp>
+    </p:spTree>
+  </p:cSld>
+  <p:clrMapOvr>
+    <a:masterClrMapping/>
+  </p:clrMapOvr>
+</p:sld>
+</file>
+
+<file path=ppt/slides/slide50.xml><?xml version="1.0" encoding="utf-8"?>
+<p:sld xmlns:a="http://schemas.openxmlformats.org/drawingml/2006/main" xmlns:r="http://schemas.openxmlformats.org/officeDocument/2006/relationships" xmlns:mc="http://schemas.openxmlformats.org/markup-compatibility/2006" xmlns:mv="urn:schemas-microsoft-com:mac:vml" xmlns:p="http://schemas.openxmlformats.org/presentationml/2006/main" xmlns:c="http://schemas.openxmlformats.org/drawingml/2006/chart" xmlns:dgm="http://schemas.openxmlformats.org/drawingml/2006/diagram" xmlns:o="urn:schemas-microsoft-com:office:office" xmlns:v="urn:schemas-microsoft-com:vml" xmlns:pvml="urn:schemas-microsoft-com:office:powerpoint" xmlns:com="http://schemas.openxmlformats.org/drawingml/2006/compatibility" xmlns:p14="http://schemas.microsoft.com/office/powerpoint/2010/main" xmlns:p15="http://schemas.microsoft.com/office/powerpoint/2012/main">
+  <p:cSld>
+    <p:spTree>
+      <p:nvGrpSpPr>
+        <p:cNvPr id="472" name="Shape 472"/>
+        <p:cNvGrpSpPr/>
+        <p:nvPr/>
+      </p:nvGrpSpPr>
+      <p:grpSpPr>
+        <a:xfrm>
+          <a:off x="0" y="0"/>
+          <a:ext cx="0" cy="0"/>
+          <a:chOff x="0" y="0"/>
+          <a:chExt cx="0" cy="0"/>
+        </a:xfrm>
+      </p:grpSpPr>
+      <p:sp>
+        <p:nvSpPr>
+          <p:cNvPr id="473" name="Shape 473"/>
+          <p:cNvSpPr txBox="1"/>
+          <p:nvPr>
+            <p:ph type="title"/>
+          </p:nvPr>
+        </p:nvSpPr>
+        <p:spPr>
+          <a:xfrm>
+            <a:off x="1297500" y="393750"/>
+            <a:ext cx="7038900" cy="914100"/>
+          </a:xfrm>
+          <a:prstGeom prst="rect">
+            <a:avLst/>
+          </a:prstGeom>
+        </p:spPr>
+        <p:txBody>
+          <a:bodyPr anchorCtr="0" anchor="t" bIns="91425" lIns="91425" spcFirstLastPara="1" rIns="91425" wrap="square" tIns="91425">
+            <a:noAutofit/>
+          </a:bodyPr>
+          <a:lstStyle/>
+          <a:p>
+            <a:pPr indent="0" lvl="0" marL="0" rtl="0">
+              <a:spcBef>
+                <a:spcPts val="0"/>
+              </a:spcBef>
+              <a:spcAft>
+                <a:spcPts val="0"/>
+              </a:spcAft>
+              <a:buNone/>
+            </a:pPr>
+            <a:r>
+              <a:rPr lang="en"/>
+              <a:t>Michael</a:t>
+            </a:r>
+            <a:endParaRPr/>
+          </a:p>
+        </p:txBody>
+      </p:sp>
+      <p:sp>
+        <p:nvSpPr>
+          <p:cNvPr id="474" name="Shape 474"/>
+          <p:cNvSpPr txBox="1"/>
+          <p:nvPr>
+            <p:ph idx="1" type="body"/>
+          </p:nvPr>
+        </p:nvSpPr>
+        <p:spPr>
+          <a:xfrm>
+            <a:off x="1297500" y="1581300"/>
+            <a:ext cx="7038900" cy="2911200"/>
+          </a:xfrm>
+          <a:prstGeom prst="rect">
+            <a:avLst/>
+          </a:prstGeom>
+        </p:spPr>
+        <p:txBody>
+          <a:bodyPr anchorCtr="0" anchor="t" bIns="91425" lIns="91425" spcFirstLastPara="1" rIns="91425" wrap="square" tIns="91425">
+            <a:noAutofit/>
+          </a:bodyPr>
+          <a:lstStyle/>
+          <a:p>
+            <a:pPr indent="0" lvl="0" marL="0" rtl="0">
+              <a:spcBef>
+                <a:spcPts val="0"/>
+              </a:spcBef>
+              <a:spcAft>
+                <a:spcPts val="0"/>
+              </a:spcAft>
+              <a:buNone/>
+            </a:pPr>
+            <a:r>
+              <a:rPr lang="en"/>
+              <a:t>Worked on:</a:t>
+            </a:r>
+            <a:endParaRPr/>
+          </a:p>
+          <a:p>
+            <a:pPr indent="-311150" lvl="0" marL="457200" rtl="0">
+              <a:spcBef>
+                <a:spcPts val="1600"/>
+              </a:spcBef>
+              <a:spcAft>
+                <a:spcPts val="0"/>
+              </a:spcAft>
+              <a:buSzPts val="1300"/>
+              <a:buChar char="●"/>
+            </a:pPr>
+            <a:r>
+              <a:rPr lang="en"/>
+              <a:t>Added default notes (Welcome, features, security/</a:t>
+            </a:r>
+            <a:r>
+              <a:rPr lang="en"/>
+              <a:t>privacy</a:t>
+            </a:r>
+            <a:r>
+              <a:rPr lang="en"/>
+              <a:t>) ( 2)</a:t>
+            </a:r>
+            <a:endParaRPr/>
+          </a:p>
+          <a:p>
+            <a:pPr indent="-311150" lvl="0" marL="457200" rtl="0">
+              <a:spcBef>
+                <a:spcPts val="0"/>
+              </a:spcBef>
+              <a:spcAft>
+                <a:spcPts val="0"/>
+              </a:spcAft>
+              <a:buSzPts val="1300"/>
+              <a:buChar char="●"/>
+            </a:pPr>
+            <a:r>
+              <a:rPr lang="en"/>
+              <a:t>Added to future website (1)</a:t>
+            </a:r>
+            <a:endParaRPr/>
+          </a:p>
+          <a:p>
+            <a:pPr indent="-311150" lvl="0" marL="457200" rtl="0">
+              <a:spcBef>
+                <a:spcPts val="0"/>
+              </a:spcBef>
+              <a:spcAft>
+                <a:spcPts val="0"/>
+              </a:spcAft>
+              <a:buSzPts val="1300"/>
+              <a:buChar char="●"/>
+            </a:pPr>
+            <a:r>
+              <a:rPr lang="en"/>
+              <a:t>Duplicate tags(needs to be continued) (3)</a:t>
+            </a:r>
+            <a:endParaRPr/>
+          </a:p>
+          <a:p>
+            <a:pPr indent="0" lvl="0" marL="0" rtl="0">
+              <a:spcBef>
+                <a:spcPts val="1600"/>
+              </a:spcBef>
+              <a:spcAft>
+                <a:spcPts val="0"/>
+              </a:spcAft>
+              <a:buNone/>
+            </a:pPr>
+            <a:r>
+              <a:rPr lang="en"/>
+              <a:t>This Sprint:</a:t>
+            </a:r>
+            <a:endParaRPr/>
+          </a:p>
+          <a:p>
+            <a:pPr indent="-311150" lvl="0" marL="457200" rtl="0">
+              <a:spcBef>
+                <a:spcPts val="1600"/>
+              </a:spcBef>
+              <a:spcAft>
+                <a:spcPts val="0"/>
+              </a:spcAft>
+              <a:buSzPts val="1300"/>
+              <a:buChar char="●"/>
+            </a:pPr>
+            <a:r>
+              <a:rPr lang="en"/>
+              <a:t>Duplicate tags(3)</a:t>
+            </a:r>
+            <a:endParaRPr/>
+          </a:p>
+          <a:p>
+            <a:pPr indent="-311150" lvl="0" marL="457200" rtl="0">
+              <a:spcBef>
+                <a:spcPts val="0"/>
+              </a:spcBef>
+              <a:spcAft>
+                <a:spcPts val="0"/>
+              </a:spcAft>
+              <a:buSzPts val="1300"/>
+              <a:buChar char="●"/>
+            </a:pPr>
+            <a:r>
+              <a:rPr lang="en"/>
+              <a:t>Improve change password interface and check for valid input(3) </a:t>
+            </a:r>
+            <a:endParaRPr/>
+          </a:p>
+        </p:txBody>
+      </p:sp>
+    </p:spTree>
+  </p:cSld>
+  <p:clrMapOvr>
+    <a:masterClrMapping/>
+  </p:clrMapOvr>
+</p:sld>
+</file>
+
+<file path=ppt/slides/slide51.xml><?xml version="1.0" encoding="utf-8"?>
+<p:sld xmlns:a="http://schemas.openxmlformats.org/drawingml/2006/main" xmlns:r="http://schemas.openxmlformats.org/officeDocument/2006/relationships" xmlns:mc="http://schemas.openxmlformats.org/markup-compatibility/2006" xmlns:mv="urn:schemas-microsoft-com:mac:vml" xmlns:p="http://schemas.openxmlformats.org/presentationml/2006/main" xmlns:c="http://schemas.openxmlformats.org/drawingml/2006/chart" xmlns:dgm="http://schemas.openxmlformats.org/drawingml/2006/diagram" xmlns:o="urn:schemas-microsoft-com:office:office" xmlns:v="urn:schemas-microsoft-com:vml" xmlns:pvml="urn:schemas-microsoft-com:office:powerpoint" xmlns:com="http://schemas.openxmlformats.org/drawingml/2006/compatibility" xmlns:p14="http://schemas.microsoft.com/office/powerpoint/2010/main" xmlns:p15="http://schemas.microsoft.com/office/powerpoint/2012/main">
+  <p:cSld>
+    <p:spTree>
+      <p:nvGrpSpPr>
+        <p:cNvPr id="478" name="Shape 478"/>
+        <p:cNvGrpSpPr/>
+        <p:nvPr/>
+      </p:nvGrpSpPr>
+      <p:grpSpPr>
+        <a:xfrm>
+          <a:off x="0" y="0"/>
+          <a:ext cx="0" cy="0"/>
+          <a:chOff x="0" y="0"/>
+          <a:chExt cx="0" cy="0"/>
+        </a:xfrm>
+      </p:grpSpPr>
+      <p:sp>
+        <p:nvSpPr>
+          <p:cNvPr id="479" name="Shape 479"/>
+          <p:cNvSpPr txBox="1"/>
+          <p:nvPr>
+            <p:ph type="title"/>
+          </p:nvPr>
+        </p:nvSpPr>
+        <p:spPr>
+          <a:xfrm>
+            <a:off x="1297500" y="380000"/>
+            <a:ext cx="7038900" cy="914100"/>
+          </a:xfrm>
+          <a:prstGeom prst="rect">
+            <a:avLst/>
+          </a:prstGeom>
+        </p:spPr>
+        <p:txBody>
+          <a:bodyPr anchorCtr="0" anchor="t" bIns="91425" lIns="91425" spcFirstLastPara="1" rIns="91425" wrap="square" tIns="91425">
+            <a:noAutofit/>
+          </a:bodyPr>
+          <a:lstStyle/>
+          <a:p>
+            <a:pPr indent="0" lvl="0" marL="0" rtl="0">
+              <a:spcBef>
+                <a:spcPts val="0"/>
+              </a:spcBef>
+              <a:spcAft>
+                <a:spcPts val="0"/>
+              </a:spcAft>
+              <a:buNone/>
+            </a:pPr>
+            <a:r>
+              <a:rPr lang="en"/>
+              <a:t>Luke</a:t>
+            </a:r>
+            <a:endParaRPr/>
+          </a:p>
+        </p:txBody>
+      </p:sp>
+      <p:sp>
+        <p:nvSpPr>
+          <p:cNvPr id="480" name="Shape 480"/>
+          <p:cNvSpPr txBox="1"/>
+          <p:nvPr>
+            <p:ph idx="1" type="body"/>
+          </p:nvPr>
+        </p:nvSpPr>
+        <p:spPr>
+          <a:xfrm>
+            <a:off x="1297500" y="1567550"/>
+            <a:ext cx="7038900" cy="2911200"/>
+          </a:xfrm>
+          <a:prstGeom prst="rect">
+            <a:avLst/>
+          </a:prstGeom>
+        </p:spPr>
+        <p:txBody>
+          <a:bodyPr anchorCtr="0" anchor="t" bIns="91425" lIns="91425" spcFirstLastPara="1" rIns="91425" wrap="square" tIns="91425">
+            <a:noAutofit/>
+          </a:bodyPr>
+          <a:lstStyle/>
+          <a:p>
+            <a:pPr indent="0" lvl="0" marL="0" rtl="0">
+              <a:spcBef>
+                <a:spcPts val="0"/>
+              </a:spcBef>
+              <a:spcAft>
+                <a:spcPts val="0"/>
+              </a:spcAft>
+              <a:buNone/>
+            </a:pPr>
+            <a:r>
+              <a:rPr lang="en"/>
+              <a:t>Worked on:</a:t>
+            </a:r>
+            <a:endParaRPr/>
+          </a:p>
+          <a:p>
+            <a:pPr indent="-311150" lvl="0" marL="457200" marR="0" rtl="0" algn="l">
+              <a:lnSpc>
+                <a:spcPct val="115000"/>
+              </a:lnSpc>
+              <a:spcBef>
+                <a:spcPts val="1600"/>
+              </a:spcBef>
+              <a:spcAft>
+                <a:spcPts val="0"/>
+              </a:spcAft>
+              <a:buSzPts val="1300"/>
+              <a:buChar char="●"/>
+            </a:pPr>
+            <a:r>
+              <a:rPr lang="en"/>
+              <a:t>SearchManager</a:t>
+            </a:r>
+            <a:endParaRPr/>
+          </a:p>
+          <a:p>
+            <a:pPr indent="-298450" lvl="1" marL="914400" marR="0" rtl="0" algn="l">
+              <a:lnSpc>
+                <a:spcPct val="115000"/>
+              </a:lnSpc>
+              <a:spcBef>
+                <a:spcPts val="0"/>
+              </a:spcBef>
+              <a:spcAft>
+                <a:spcPts val="0"/>
+              </a:spcAft>
+              <a:buSzPts val="1100"/>
+              <a:buChar char="○"/>
+            </a:pPr>
+            <a:r>
+              <a:rPr lang="en"/>
+              <a:t>As a user, I want to search for notes containing word(s) (5)</a:t>
+            </a:r>
+            <a:endParaRPr/>
+          </a:p>
+          <a:p>
+            <a:pPr indent="0" lvl="0" marL="0" rtl="0">
+              <a:spcBef>
+                <a:spcPts val="1600"/>
+              </a:spcBef>
+              <a:spcAft>
+                <a:spcPts val="0"/>
+              </a:spcAft>
+              <a:buNone/>
+            </a:pPr>
+            <a:r>
+              <a:rPr lang="en"/>
+              <a:t>This Sprint:</a:t>
+            </a:r>
+            <a:endParaRPr/>
+          </a:p>
+          <a:p>
+            <a:pPr indent="-311150" lvl="0" marL="457200" marR="0" rtl="0" algn="l">
+              <a:lnSpc>
+                <a:spcPct val="115000"/>
+              </a:lnSpc>
+              <a:spcBef>
+                <a:spcPts val="1600"/>
+              </a:spcBef>
+              <a:spcAft>
+                <a:spcPts val="0"/>
+              </a:spcAft>
+              <a:buClr>
+                <a:schemeClr val="lt1"/>
+              </a:buClr>
+              <a:buSzPts val="1300"/>
+              <a:buFont typeface="Lato"/>
+              <a:buChar char="●"/>
+            </a:pPr>
+            <a:r>
+              <a:rPr lang="en"/>
+              <a:t>SearchManager</a:t>
+            </a:r>
+            <a:endParaRPr/>
+          </a:p>
+          <a:p>
+            <a:pPr indent="-298450" lvl="1" marL="914400" marR="0" rtl="0" algn="l">
+              <a:lnSpc>
+                <a:spcPct val="115000"/>
+              </a:lnSpc>
+              <a:spcBef>
+                <a:spcPts val="0"/>
+              </a:spcBef>
+              <a:spcAft>
+                <a:spcPts val="0"/>
+              </a:spcAft>
+              <a:buSzPts val="1100"/>
+              <a:buChar char="○"/>
+            </a:pPr>
+            <a:r>
+              <a:rPr lang="en"/>
+              <a:t>I want to be able to search for notes containing a term (7)</a:t>
+            </a:r>
+            <a:endParaRPr/>
+          </a:p>
+          <a:p>
+            <a:pPr indent="-298450" lvl="1" marL="914400" marR="0" rtl="0" algn="l">
+              <a:lnSpc>
+                <a:spcPct val="115000"/>
+              </a:lnSpc>
+              <a:spcBef>
+                <a:spcPts val="0"/>
+              </a:spcBef>
+              <a:spcAft>
+                <a:spcPts val="0"/>
+              </a:spcAft>
+              <a:buSzPts val="1100"/>
+              <a:buChar char="○"/>
+            </a:pPr>
+            <a:r>
+              <a:rPr lang="en"/>
+              <a:t>I want to be able to search for notes containing two terms (3)</a:t>
+            </a:r>
+            <a:endParaRPr/>
+          </a:p>
+          <a:p>
+            <a:pPr indent="0" lvl="0" marL="457200" marR="0" rtl="0" algn="l">
+              <a:lnSpc>
+                <a:spcPct val="115000"/>
+              </a:lnSpc>
+              <a:spcBef>
+                <a:spcPts val="1600"/>
+              </a:spcBef>
+              <a:spcAft>
+                <a:spcPts val="1600"/>
+              </a:spcAft>
+              <a:buNone/>
+            </a:pPr>
+            <a:r>
+              <a:t/>
+            </a:r>
+            <a:endParaRPr/>
           </a:p>
         </p:txBody>
       </p:sp>
@@ -24920,6 +27125,285 @@
 </file>
 
 <file path=ppt/theme/theme1.xml><?xml version="1.0" encoding="utf-8"?>
+<a:theme xmlns:a="http://schemas.openxmlformats.org/drawingml/2006/main" xmlns:r="http://schemas.openxmlformats.org/officeDocument/2006/relationships">
+  <a:themeElements>
+    <a:clrScheme name="Default">
+      <a:dk1>
+        <a:srgbClr val="000000"/>
+      </a:dk1>
+      <a:lt1>
+        <a:srgbClr val="FFFFFF"/>
+      </a:lt1>
+      <a:dk2>
+        <a:srgbClr val="158158"/>
+      </a:dk2>
+      <a:lt2>
+        <a:srgbClr val="F3F3F3"/>
+      </a:lt2>
+      <a:accent1>
+        <a:srgbClr val="058DC7"/>
+      </a:accent1>
+      <a:accent2>
+        <a:srgbClr val="50B432"/>
+      </a:accent2>
+      <a:accent3>
+        <a:srgbClr val="ED561B"/>
+      </a:accent3>
+      <a:accent4>
+        <a:srgbClr val="EDEF00"/>
+      </a:accent4>
+      <a:accent5>
+        <a:srgbClr val="24CBE5"/>
+      </a:accent5>
+      <a:accent6>
+        <a:srgbClr val="64E572"/>
+      </a:accent6>
+      <a:hlink>
+        <a:srgbClr val="2200CC"/>
+      </a:hlink>
+      <a:folHlink>
+        <a:srgbClr val="551A8B"/>
+      </a:folHlink>
+    </a:clrScheme>
+    <a:fontScheme name="Office">
+      <a:majorFont>
+        <a:latin typeface="Arial"/>
+        <a:ea typeface=""/>
+        <a:cs typeface=""/>
+        <a:font script="Jpan" typeface="ＭＳ Ｐゴシック"/>
+        <a:font script="Hang" typeface="맑은 고딕"/>
+        <a:font script="Hans" typeface="宋体"/>
+        <a:font script="Hant" typeface="新細明體"/>
+        <a:font script="Arab" typeface="Times New Roman"/>
+        <a:font script="Hebr" typeface="Times New Roman"/>
+        <a:font script="Thai" typeface="Angsana New"/>
+        <a:font script="Ethi" typeface="Nyala"/>
+        <a:font script="Beng" typeface="Vrinda"/>
+        <a:font script="Gujr" typeface="Shruti"/>
+        <a:font script="Khmr" typeface="MoolBoran"/>
+        <a:font script="Knda" typeface="Tunga"/>
+        <a:font script="Guru" typeface="Raavi"/>
+        <a:font script="Cans" typeface="Euphemia"/>
+        <a:font script="Cher" typeface="Plantagenet Cherokee"/>
+        <a:font script="Yiii" typeface="Microsoft Yi Baiti"/>
+        <a:font script="Tibt" typeface="Microsoft Himalaya"/>
+        <a:font script="Thaa" typeface="MV Boli"/>
+        <a:font script="Deva" typeface="Mangal"/>
+        <a:font script="Telu" typeface="Gautami"/>
+        <a:font script="Taml" typeface="Latha"/>
+        <a:font script="Syrc" typeface="Estrangelo Edessa"/>
+        <a:font script="Orya" typeface="Kalinga"/>
+        <a:font script="Mlym" typeface="Kartika"/>
+        <a:font script="Laoo" typeface="DokChampa"/>
+        <a:font script="Sinh" typeface="Iskoola Pota"/>
+        <a:font script="Mong" typeface="Mongolian Baiti"/>
+        <a:font script="Viet" typeface="Times New Roman"/>
+        <a:font script="Uigh" typeface="Microsoft Uighur"/>
+        <a:font script="Geor" typeface="Sylfaen"/>
+      </a:majorFont>
+      <a:minorFont>
+        <a:latin typeface="Arial"/>
+        <a:ea typeface=""/>
+        <a:cs typeface=""/>
+        <a:font script="Jpan" typeface="ＭＳ Ｐゴシック"/>
+        <a:font script="Hang" typeface="맑은 고딕"/>
+        <a:font script="Hans" typeface="宋体"/>
+        <a:font script="Hant" typeface="新細明體"/>
+        <a:font script="Arab" typeface="Arial"/>
+        <a:font script="Hebr" typeface="Arial"/>
+        <a:font script="Thai" typeface="Cordia New"/>
+        <a:font script="Ethi" typeface="Nyala"/>
+        <a:font script="Beng" typeface="Vrinda"/>
+        <a:font script="Gujr" typeface="Shruti"/>
+        <a:font script="Khmr" typeface="DaunPenh"/>
+        <a:font script="Knda" typeface="Tunga"/>
+        <a:font script="Guru" typeface="Raavi"/>
+        <a:font script="Cans" typeface="Euphemia"/>
+        <a:font script="Cher" typeface="Plantagenet Cherokee"/>
+        <a:font script="Yiii" typeface="Microsoft Yi Baiti"/>
+        <a:font script="Tibt" typeface="Microsoft Himalaya"/>
+        <a:font script="Thaa" typeface="MV Boli"/>
+        <a:font script="Deva" typeface="Mangal"/>
+        <a:font script="Telu" typeface="Gautami"/>
+        <a:font script="Taml" typeface="Latha"/>
+        <a:font script="Syrc" typeface="Estrangelo Edessa"/>
+        <a:font script="Orya" typeface="Kalinga"/>
+        <a:font script="Mlym" typeface="Kartika"/>
+        <a:font script="Laoo" typeface="DokChampa"/>
+        <a:font script="Sinh" typeface="Iskoola Pota"/>
+        <a:font script="Mong" typeface="Mongolian Baiti"/>
+        <a:font script="Viet" typeface="Arial"/>
+        <a:font script="Uigh" typeface="Microsoft Uighur"/>
+        <a:font script="Geor" typeface="Sylfaen"/>
+      </a:minorFont>
+    </a:fontScheme>
+    <a:fmtScheme name="Office">
+      <a:fillStyleLst>
+        <a:solidFill>
+          <a:schemeClr val="phClr"/>
+        </a:solidFill>
+        <a:gradFill rotWithShape="1">
+          <a:gsLst>
+            <a:gs pos="0">
+              <a:schemeClr val="phClr">
+                <a:tint val="50000"/>
+                <a:satMod val="300000"/>
+              </a:schemeClr>
+            </a:gs>
+            <a:gs pos="35000">
+              <a:schemeClr val="phClr">
+                <a:tint val="37000"/>
+                <a:satMod val="300000"/>
+              </a:schemeClr>
+            </a:gs>
+            <a:gs pos="100000">
+              <a:schemeClr val="phClr">
+                <a:tint val="15000"/>
+                <a:satMod val="350000"/>
+              </a:schemeClr>
+            </a:gs>
+          </a:gsLst>
+          <a:lin ang="16200000" scaled="1"/>
+        </a:gradFill>
+        <a:gradFill rotWithShape="1">
+          <a:gsLst>
+            <a:gs pos="0">
+              <a:schemeClr val="phClr">
+                <a:tint val="100000"/>
+                <a:shade val="100000"/>
+                <a:satMod val="130000"/>
+              </a:schemeClr>
+            </a:gs>
+            <a:gs pos="100000">
+              <a:schemeClr val="phClr">
+                <a:tint val="50000"/>
+                <a:shade val="100000"/>
+                <a:satMod val="350000"/>
+              </a:schemeClr>
+            </a:gs>
+          </a:gsLst>
+          <a:lin ang="16200000" scaled="0"/>
+        </a:gradFill>
+      </a:fillStyleLst>
+      <a:lnStyleLst>
+        <a:ln w="9525" cap="flat" cmpd="sng" algn="ctr">
+          <a:solidFill>
+            <a:schemeClr val="phClr">
+              <a:shade val="95000"/>
+              <a:satMod val="105000"/>
+            </a:schemeClr>
+          </a:solidFill>
+          <a:prstDash val="solid"/>
+        </a:ln>
+        <a:ln w="25400" cap="flat" cmpd="sng" algn="ctr">
+          <a:solidFill>
+            <a:schemeClr val="phClr"/>
+          </a:solidFill>
+          <a:prstDash val="solid"/>
+        </a:ln>
+        <a:ln w="38100" cap="flat" cmpd="sng" algn="ctr">
+          <a:solidFill>
+            <a:schemeClr val="phClr"/>
+          </a:solidFill>
+          <a:prstDash val="solid"/>
+        </a:ln>
+      </a:lnStyleLst>
+      <a:effectStyleLst>
+        <a:effectStyle>
+          <a:effectLst>
+            <a:outerShdw blurRad="40000" dist="20000" dir="5400000" rotWithShape="0">
+              <a:srgbClr val="000000">
+                <a:alpha val="38000"/>
+              </a:srgbClr>
+            </a:outerShdw>
+          </a:effectLst>
+        </a:effectStyle>
+        <a:effectStyle>
+          <a:effectLst>
+            <a:outerShdw blurRad="40000" dist="23000" dir="5400000" rotWithShape="0">
+              <a:srgbClr val="000000">
+                <a:alpha val="35000"/>
+              </a:srgbClr>
+            </a:outerShdw>
+          </a:effectLst>
+        </a:effectStyle>
+        <a:effectStyle>
+          <a:effectLst>
+            <a:outerShdw blurRad="40000" dist="23000" dir="5400000" rotWithShape="0">
+              <a:srgbClr val="000000">
+                <a:alpha val="35000"/>
+              </a:srgbClr>
+            </a:outerShdw>
+          </a:effectLst>
+          <a:scene3d>
+            <a:camera prst="orthographicFront">
+              <a:rot lat="0" lon="0" rev="0"/>
+            </a:camera>
+            <a:lightRig rig="threePt" dir="t">
+              <a:rot lat="0" lon="0" rev="1200000"/>
+            </a:lightRig>
+          </a:scene3d>
+          <a:sp3d>
+            <a:bevelT w="63500" h="25400"/>
+          </a:sp3d>
+        </a:effectStyle>
+      </a:effectStyleLst>
+      <a:bgFillStyleLst>
+        <a:solidFill>
+          <a:schemeClr val="phClr"/>
+        </a:solidFill>
+        <a:gradFill rotWithShape="1">
+          <a:gsLst>
+            <a:gs pos="0">
+              <a:schemeClr val="phClr">
+                <a:tint val="40000"/>
+                <a:satMod val="350000"/>
+              </a:schemeClr>
+            </a:gs>
+            <a:gs pos="40000">
+              <a:schemeClr val="phClr">
+                <a:tint val="45000"/>
+                <a:shade val="99000"/>
+                <a:satMod val="350000"/>
+              </a:schemeClr>
+            </a:gs>
+            <a:gs pos="100000">
+              <a:schemeClr val="phClr">
+                <a:shade val="20000"/>
+                <a:satMod val="255000"/>
+              </a:schemeClr>
+            </a:gs>
+          </a:gsLst>
+          <a:path path="circle">
+            <a:fillToRect l="50000" t="-80000" r="50000" b="180000"/>
+          </a:path>
+        </a:gradFill>
+        <a:gradFill rotWithShape="1">
+          <a:gsLst>
+            <a:gs pos="0">
+              <a:schemeClr val="phClr">
+                <a:tint val="80000"/>
+                <a:satMod val="300000"/>
+              </a:schemeClr>
+            </a:gs>
+            <a:gs pos="100000">
+              <a:schemeClr val="phClr">
+                <a:shade val="30000"/>
+                <a:satMod val="200000"/>
+              </a:schemeClr>
+            </a:gs>
+          </a:gsLst>
+          <a:path path="circle">
+            <a:fillToRect l="50000" t="50000" r="50000" b="50000"/>
+          </a:path>
+        </a:gradFill>
+      </a:bgFillStyleLst>
+    </a:fmtScheme>
+  </a:themeElements>
+</a:theme>
+</file>
+
+<file path=ppt/theme/theme2.xml><?xml version="1.0" encoding="utf-8"?>
 <a:theme xmlns:a="http://schemas.openxmlformats.org/drawingml/2006/main" xmlns:r="http://schemas.openxmlformats.org/officeDocument/2006/relationships" name="Focus">
   <a:themeElements>
     <a:clrScheme name="Focus">
@@ -25196,283 +27680,4 @@
     </a:fmtScheme>
   </a:themeElements>
 </a:theme>
-</file>
-
-<file path=ppt/theme/theme2.xml><?xml version="1.0" encoding="utf-8"?>
-<a:theme xmlns:a="http://schemas.openxmlformats.org/drawingml/2006/main" xmlns:r="http://schemas.openxmlformats.org/officeDocument/2006/relationships">
-  <a:themeElements>
-    <a:clrScheme name="Default">
-      <a:dk1>
-        <a:srgbClr val="000000"/>
-      </a:dk1>
-      <a:lt1>
-        <a:srgbClr val="FFFFFF"/>
-      </a:lt1>
-      <a:dk2>
-        <a:srgbClr val="158158"/>
-      </a:dk2>
-      <a:lt2>
-        <a:srgbClr val="F3F3F3"/>
-      </a:lt2>
-      <a:accent1>
-        <a:srgbClr val="058DC7"/>
-      </a:accent1>
-      <a:accent2>
-        <a:srgbClr val="50B432"/>
-      </a:accent2>
-      <a:accent3>
-        <a:srgbClr val="ED561B"/>
-      </a:accent3>
-      <a:accent4>
-        <a:srgbClr val="EDEF00"/>
-      </a:accent4>
-      <a:accent5>
-        <a:srgbClr val="24CBE5"/>
-      </a:accent5>
-      <a:accent6>
-        <a:srgbClr val="64E572"/>
-      </a:accent6>
-      <a:hlink>
-        <a:srgbClr val="2200CC"/>
-      </a:hlink>
-      <a:folHlink>
-        <a:srgbClr val="551A8B"/>
-      </a:folHlink>
-    </a:clrScheme>
-    <a:fontScheme name="Office">
-      <a:majorFont>
-        <a:latin typeface="Arial"/>
-        <a:ea typeface=""/>
-        <a:cs typeface=""/>
-        <a:font script="Jpan" typeface="ＭＳ Ｐゴシック"/>
-        <a:font script="Hang" typeface="맑은 고딕"/>
-        <a:font script="Hans" typeface="宋体"/>
-        <a:font script="Hant" typeface="新細明體"/>
-        <a:font script="Arab" typeface="Times New Roman"/>
-        <a:font script="Hebr" typeface="Times New Roman"/>
-        <a:font script="Thai" typeface="Angsana New"/>
-        <a:font script="Ethi" typeface="Nyala"/>
-        <a:font script="Beng" typeface="Vrinda"/>
-        <a:font script="Gujr" typeface="Shruti"/>
-        <a:font script="Khmr" typeface="MoolBoran"/>
-        <a:font script="Knda" typeface="Tunga"/>
-        <a:font script="Guru" typeface="Raavi"/>
-        <a:font script="Cans" typeface="Euphemia"/>
-        <a:font script="Cher" typeface="Plantagenet Cherokee"/>
-        <a:font script="Yiii" typeface="Microsoft Yi Baiti"/>
-        <a:font script="Tibt" typeface="Microsoft Himalaya"/>
-        <a:font script="Thaa" typeface="MV Boli"/>
-        <a:font script="Deva" typeface="Mangal"/>
-        <a:font script="Telu" typeface="Gautami"/>
-        <a:font script="Taml" typeface="Latha"/>
-        <a:font script="Syrc" typeface="Estrangelo Edessa"/>
-        <a:font script="Orya" typeface="Kalinga"/>
-        <a:font script="Mlym" typeface="Kartika"/>
-        <a:font script="Laoo" typeface="DokChampa"/>
-        <a:font script="Sinh" typeface="Iskoola Pota"/>
-        <a:font script="Mong" typeface="Mongolian Baiti"/>
-        <a:font script="Viet" typeface="Times New Roman"/>
-        <a:font script="Uigh" typeface="Microsoft Uighur"/>
-        <a:font script="Geor" typeface="Sylfaen"/>
-      </a:majorFont>
-      <a:minorFont>
-        <a:latin typeface="Arial"/>
-        <a:ea typeface=""/>
-        <a:cs typeface=""/>
-        <a:font script="Jpan" typeface="ＭＳ Ｐゴシック"/>
-        <a:font script="Hang" typeface="맑은 고딕"/>
-        <a:font script="Hans" typeface="宋体"/>
-        <a:font script="Hant" typeface="新細明體"/>
-        <a:font script="Arab" typeface="Arial"/>
-        <a:font script="Hebr" typeface="Arial"/>
-        <a:font script="Thai" typeface="Cordia New"/>
-        <a:font script="Ethi" typeface="Nyala"/>
-        <a:font script="Beng" typeface="Vrinda"/>
-        <a:font script="Gujr" typeface="Shruti"/>
-        <a:font script="Khmr" typeface="DaunPenh"/>
-        <a:font script="Knda" typeface="Tunga"/>
-        <a:font script="Guru" typeface="Raavi"/>
-        <a:font script="Cans" typeface="Euphemia"/>
-        <a:font script="Cher" typeface="Plantagenet Cherokee"/>
-        <a:font script="Yiii" typeface="Microsoft Yi Baiti"/>
-        <a:font script="Tibt" typeface="Microsoft Himalaya"/>
-        <a:font script="Thaa" typeface="MV Boli"/>
-        <a:font script="Deva" typeface="Mangal"/>
-        <a:font script="Telu" typeface="Gautami"/>
-        <a:font script="Taml" typeface="Latha"/>
-        <a:font script="Syrc" typeface="Estrangelo Edessa"/>
-        <a:font script="Orya" typeface="Kalinga"/>
-        <a:font script="Mlym" typeface="Kartika"/>
-        <a:font script="Laoo" typeface="DokChampa"/>
-        <a:font script="Sinh" typeface="Iskoola Pota"/>
-        <a:font script="Mong" typeface="Mongolian Baiti"/>
-        <a:font script="Viet" typeface="Arial"/>
-        <a:font script="Uigh" typeface="Microsoft Uighur"/>
-        <a:font script="Geor" typeface="Sylfaen"/>
-      </a:minorFont>
-    </a:fontScheme>
-    <a:fmtScheme name="Office">
-      <a:fillStyleLst>
-        <a:solidFill>
-          <a:schemeClr val="phClr"/>
-        </a:solidFill>
-        <a:gradFill rotWithShape="1">
-          <a:gsLst>
-            <a:gs pos="0">
-              <a:schemeClr val="phClr">
-                <a:tint val="50000"/>
-                <a:satMod val="300000"/>
-              </a:schemeClr>
-            </a:gs>
-            <a:gs pos="35000">
-              <a:schemeClr val="phClr">
-                <a:tint val="37000"/>
-                <a:satMod val="300000"/>
-              </a:schemeClr>
-            </a:gs>
-            <a:gs pos="100000">
-              <a:schemeClr val="phClr">
-                <a:tint val="15000"/>
-                <a:satMod val="350000"/>
-              </a:schemeClr>
-            </a:gs>
-          </a:gsLst>
-          <a:lin ang="16200000" scaled="1"/>
-        </a:gradFill>
-        <a:gradFill rotWithShape="1">
-          <a:gsLst>
-            <a:gs pos="0">
-              <a:schemeClr val="phClr">
-                <a:tint val="100000"/>
-                <a:shade val="100000"/>
-                <a:satMod val="130000"/>
-              </a:schemeClr>
-            </a:gs>
-            <a:gs pos="100000">
-              <a:schemeClr val="phClr">
-                <a:tint val="50000"/>
-                <a:shade val="100000"/>
-                <a:satMod val="350000"/>
-              </a:schemeClr>
-            </a:gs>
-          </a:gsLst>
-          <a:lin ang="16200000" scaled="0"/>
-        </a:gradFill>
-      </a:fillStyleLst>
-      <a:lnStyleLst>
-        <a:ln w="9525" cap="flat" cmpd="sng" algn="ctr">
-          <a:solidFill>
-            <a:schemeClr val="phClr">
-              <a:shade val="95000"/>
-              <a:satMod val="105000"/>
-            </a:schemeClr>
-          </a:solidFill>
-          <a:prstDash val="solid"/>
-        </a:ln>
-        <a:ln w="25400" cap="flat" cmpd="sng" algn="ctr">
-          <a:solidFill>
-            <a:schemeClr val="phClr"/>
-          </a:solidFill>
-          <a:prstDash val="solid"/>
-        </a:ln>
-        <a:ln w="38100" cap="flat" cmpd="sng" algn="ctr">
-          <a:solidFill>
-            <a:schemeClr val="phClr"/>
-          </a:solidFill>
-          <a:prstDash val="solid"/>
-        </a:ln>
-      </a:lnStyleLst>
-      <a:effectStyleLst>
-        <a:effectStyle>
-          <a:effectLst>
-            <a:outerShdw blurRad="40000" dist="20000" dir="5400000" rotWithShape="0">
-              <a:srgbClr val="000000">
-                <a:alpha val="38000"/>
-              </a:srgbClr>
-            </a:outerShdw>
-          </a:effectLst>
-        </a:effectStyle>
-        <a:effectStyle>
-          <a:effectLst>
-            <a:outerShdw blurRad="40000" dist="23000" dir="5400000" rotWithShape="0">
-              <a:srgbClr val="000000">
-                <a:alpha val="35000"/>
-              </a:srgbClr>
-            </a:outerShdw>
-          </a:effectLst>
-        </a:effectStyle>
-        <a:effectStyle>
-          <a:effectLst>
-            <a:outerShdw blurRad="40000" dist="23000" dir="5400000" rotWithShape="0">
-              <a:srgbClr val="000000">
-                <a:alpha val="35000"/>
-              </a:srgbClr>
-            </a:outerShdw>
-          </a:effectLst>
-          <a:scene3d>
-            <a:camera prst="orthographicFront">
-              <a:rot lat="0" lon="0" rev="0"/>
-            </a:camera>
-            <a:lightRig rig="threePt" dir="t">
-              <a:rot lat="0" lon="0" rev="1200000"/>
-            </a:lightRig>
-          </a:scene3d>
-          <a:sp3d>
-            <a:bevelT w="63500" h="25400"/>
-          </a:sp3d>
-        </a:effectStyle>
-      </a:effectStyleLst>
-      <a:bgFillStyleLst>
-        <a:solidFill>
-          <a:schemeClr val="phClr"/>
-        </a:solidFill>
-        <a:gradFill rotWithShape="1">
-          <a:gsLst>
-            <a:gs pos="0">
-              <a:schemeClr val="phClr">
-                <a:tint val="40000"/>
-                <a:satMod val="350000"/>
-              </a:schemeClr>
-            </a:gs>
-            <a:gs pos="40000">
-              <a:schemeClr val="phClr">
-                <a:tint val="45000"/>
-                <a:shade val="99000"/>
-                <a:satMod val="350000"/>
-              </a:schemeClr>
-            </a:gs>
-            <a:gs pos="100000">
-              <a:schemeClr val="phClr">
-                <a:shade val="20000"/>
-                <a:satMod val="255000"/>
-              </a:schemeClr>
-            </a:gs>
-          </a:gsLst>
-          <a:path path="circle">
-            <a:fillToRect l="50000" t="-80000" r="50000" b="180000"/>
-          </a:path>
-        </a:gradFill>
-        <a:gradFill rotWithShape="1">
-          <a:gsLst>
-            <a:gs pos="0">
-              <a:schemeClr val="phClr">
-                <a:tint val="80000"/>
-                <a:satMod val="300000"/>
-              </a:schemeClr>
-            </a:gs>
-            <a:gs pos="100000">
-              <a:schemeClr val="phClr">
-                <a:shade val="30000"/>
-                <a:satMod val="200000"/>
-              </a:schemeClr>
-            </a:gs>
-          </a:gsLst>
-          <a:path path="circle">
-            <a:fillToRect l="50000" t="50000" r="50000" b="50000"/>
-          </a:path>
-        </a:gradFill>
-      </a:bgFillStyleLst>
-    </a:fmtScheme>
-  </a:themeElements>
-</a:theme>
 </file>
</xml_diff>

<commit_message>
Fix Alex's sprint slide. Update for 3/26
</commit_message>
<xml_diff>
--- a/SUM Presentations.pptx
+++ b/SUM Presentations.pptx
@@ -14487,7 +14487,7 @@
             <a:tbl>
               <a:tblPr>
                 <a:noFill/>
-                <a:tableStyleId>{87B8963E-5412-4145-8AB6-BC64BA2F392C}</a:tableStyleId>
+                <a:tableStyleId>{B914DEB5-FC21-47BE-B940-B13AC623A223}</a:tableStyleId>
               </a:tblPr>
               <a:tblGrid>
                 <a:gridCol w="1199350"/>
@@ -19135,7 +19135,7 @@
             <a:tbl>
               <a:tblPr>
                 <a:noFill/>
-                <a:tableStyleId>{87B8963E-5412-4145-8AB6-BC64BA2F392C}</a:tableStyleId>
+                <a:tableStyleId>{B914DEB5-FC21-47BE-B940-B13AC623A223}</a:tableStyleId>
               </a:tblPr>
               <a:tblGrid>
                 <a:gridCol w="1788200"/>
@@ -21241,7 +21241,7 @@
             <a:tbl>
               <a:tblPr>
                 <a:noFill/>
-                <a:tableStyleId>{87B8963E-5412-4145-8AB6-BC64BA2F392C}</a:tableStyleId>
+                <a:tableStyleId>{B914DEB5-FC21-47BE-B940-B13AC623A223}</a:tableStyleId>
               </a:tblPr>
               <a:tblGrid>
                 <a:gridCol w="2119300"/>
@@ -22036,7 +22036,7 @@
             <a:tbl>
               <a:tblPr>
                 <a:noFill/>
-                <a:tableStyleId>{87B8963E-5412-4145-8AB6-BC64BA2F392C}</a:tableStyleId>
+                <a:tableStyleId>{B914DEB5-FC21-47BE-B940-B13AC623A223}</a:tableStyleId>
               </a:tblPr>
               <a:tblGrid>
                 <a:gridCol w="815250"/>
@@ -22548,7 +22548,7 @@
             <a:tbl>
               <a:tblPr>
                 <a:noFill/>
-                <a:tableStyleId>{87B8963E-5412-4145-8AB6-BC64BA2F392C}</a:tableStyleId>
+                <a:tableStyleId>{B914DEB5-FC21-47BE-B940-B13AC623A223}</a:tableStyleId>
               </a:tblPr>
               <a:tblGrid>
                 <a:gridCol w="1967400"/>
@@ -25518,7 +25518,7 @@
             </a:r>
             <a:r>
               <a:rPr lang="en" sz="1400"/>
-              <a:t>have to switch to using the Dropbox Core API</a:t>
+              <a:t>want to save to device storage and sync from there</a:t>
             </a:r>
             <a:endParaRPr sz="1400"/>
           </a:p>
@@ -27125,6 +27125,285 @@
 </file>
 
 <file path=ppt/theme/theme1.xml><?xml version="1.0" encoding="utf-8"?>
+<a:theme xmlns:a="http://schemas.openxmlformats.org/drawingml/2006/main" xmlns:r="http://schemas.openxmlformats.org/officeDocument/2006/relationships" name="Focus">
+  <a:themeElements>
+    <a:clrScheme name="Focus">
+      <a:dk1>
+        <a:srgbClr val="1B212C"/>
+      </a:dk1>
+      <a:lt1>
+        <a:srgbClr val="FFFFFF"/>
+      </a:lt1>
+      <a:dk2>
+        <a:srgbClr val="D9D9D9"/>
+      </a:dk2>
+      <a:lt2>
+        <a:srgbClr val="82C7A5"/>
+      </a:lt2>
+      <a:accent1>
+        <a:srgbClr val="0145AC"/>
+      </a:accent1>
+      <a:accent2>
+        <a:srgbClr val="EECE1A"/>
+      </a:accent2>
+      <a:accent3>
+        <a:srgbClr val="4E5567"/>
+      </a:accent3>
+      <a:accent4>
+        <a:srgbClr val="F4D6AD"/>
+      </a:accent4>
+      <a:accent5>
+        <a:srgbClr val="7890CD"/>
+      </a:accent5>
+      <a:accent6>
+        <a:srgbClr val="F15E22"/>
+      </a:accent6>
+      <a:hlink>
+        <a:srgbClr val="7890CD"/>
+      </a:hlink>
+      <a:folHlink>
+        <a:srgbClr val="7890CD"/>
+      </a:folHlink>
+    </a:clrScheme>
+    <a:fontScheme name="Office">
+      <a:majorFont>
+        <a:latin typeface="Arial"/>
+        <a:ea typeface=""/>
+        <a:cs typeface=""/>
+        <a:font script="Jpan" typeface="ＭＳ Ｐゴシック"/>
+        <a:font script="Hang" typeface="맑은 고딕"/>
+        <a:font script="Hans" typeface="宋体"/>
+        <a:font script="Hant" typeface="新細明體"/>
+        <a:font script="Arab" typeface="Times New Roman"/>
+        <a:font script="Hebr" typeface="Times New Roman"/>
+        <a:font script="Thai" typeface="Angsana New"/>
+        <a:font script="Ethi" typeface="Nyala"/>
+        <a:font script="Beng" typeface="Vrinda"/>
+        <a:font script="Gujr" typeface="Shruti"/>
+        <a:font script="Khmr" typeface="MoolBoran"/>
+        <a:font script="Knda" typeface="Tunga"/>
+        <a:font script="Guru" typeface="Raavi"/>
+        <a:font script="Cans" typeface="Euphemia"/>
+        <a:font script="Cher" typeface="Plantagenet Cherokee"/>
+        <a:font script="Yiii" typeface="Microsoft Yi Baiti"/>
+        <a:font script="Tibt" typeface="Microsoft Himalaya"/>
+        <a:font script="Thaa" typeface="MV Boli"/>
+        <a:font script="Deva" typeface="Mangal"/>
+        <a:font script="Telu" typeface="Gautami"/>
+        <a:font script="Taml" typeface="Latha"/>
+        <a:font script="Syrc" typeface="Estrangelo Edessa"/>
+        <a:font script="Orya" typeface="Kalinga"/>
+        <a:font script="Mlym" typeface="Kartika"/>
+        <a:font script="Laoo" typeface="DokChampa"/>
+        <a:font script="Sinh" typeface="Iskoola Pota"/>
+        <a:font script="Mong" typeface="Mongolian Baiti"/>
+        <a:font script="Viet" typeface="Times New Roman"/>
+        <a:font script="Uigh" typeface="Microsoft Uighur"/>
+        <a:font script="Geor" typeface="Sylfaen"/>
+      </a:majorFont>
+      <a:minorFont>
+        <a:latin typeface="Arial"/>
+        <a:ea typeface=""/>
+        <a:cs typeface=""/>
+        <a:font script="Jpan" typeface="ＭＳ Ｐゴシック"/>
+        <a:font script="Hang" typeface="맑은 고딕"/>
+        <a:font script="Hans" typeface="宋体"/>
+        <a:font script="Hant" typeface="新細明體"/>
+        <a:font script="Arab" typeface="Arial"/>
+        <a:font script="Hebr" typeface="Arial"/>
+        <a:font script="Thai" typeface="Cordia New"/>
+        <a:font script="Ethi" typeface="Nyala"/>
+        <a:font script="Beng" typeface="Vrinda"/>
+        <a:font script="Gujr" typeface="Shruti"/>
+        <a:font script="Khmr" typeface="DaunPenh"/>
+        <a:font script="Knda" typeface="Tunga"/>
+        <a:font script="Guru" typeface="Raavi"/>
+        <a:font script="Cans" typeface="Euphemia"/>
+        <a:font script="Cher" typeface="Plantagenet Cherokee"/>
+        <a:font script="Yiii" typeface="Microsoft Yi Baiti"/>
+        <a:font script="Tibt" typeface="Microsoft Himalaya"/>
+        <a:font script="Thaa" typeface="MV Boli"/>
+        <a:font script="Deva" typeface="Mangal"/>
+        <a:font script="Telu" typeface="Gautami"/>
+        <a:font script="Taml" typeface="Latha"/>
+        <a:font script="Syrc" typeface="Estrangelo Edessa"/>
+        <a:font script="Orya" typeface="Kalinga"/>
+        <a:font script="Mlym" typeface="Kartika"/>
+        <a:font script="Laoo" typeface="DokChampa"/>
+        <a:font script="Sinh" typeface="Iskoola Pota"/>
+        <a:font script="Mong" typeface="Mongolian Baiti"/>
+        <a:font script="Viet" typeface="Arial"/>
+        <a:font script="Uigh" typeface="Microsoft Uighur"/>
+        <a:font script="Geor" typeface="Sylfaen"/>
+      </a:minorFont>
+    </a:fontScheme>
+    <a:fmtScheme name="Office">
+      <a:fillStyleLst>
+        <a:solidFill>
+          <a:schemeClr val="phClr"/>
+        </a:solidFill>
+        <a:gradFill rotWithShape="1">
+          <a:gsLst>
+            <a:gs pos="0">
+              <a:schemeClr val="phClr">
+                <a:tint val="50000"/>
+                <a:satMod val="300000"/>
+              </a:schemeClr>
+            </a:gs>
+            <a:gs pos="35000">
+              <a:schemeClr val="phClr">
+                <a:tint val="37000"/>
+                <a:satMod val="300000"/>
+              </a:schemeClr>
+            </a:gs>
+            <a:gs pos="100000">
+              <a:schemeClr val="phClr">
+                <a:tint val="15000"/>
+                <a:satMod val="350000"/>
+              </a:schemeClr>
+            </a:gs>
+          </a:gsLst>
+          <a:lin ang="16200000" scaled="1"/>
+        </a:gradFill>
+        <a:gradFill rotWithShape="1">
+          <a:gsLst>
+            <a:gs pos="0">
+              <a:schemeClr val="phClr">
+                <a:tint val="100000"/>
+                <a:shade val="100000"/>
+                <a:satMod val="130000"/>
+              </a:schemeClr>
+            </a:gs>
+            <a:gs pos="100000">
+              <a:schemeClr val="phClr">
+                <a:tint val="50000"/>
+                <a:shade val="100000"/>
+                <a:satMod val="350000"/>
+              </a:schemeClr>
+            </a:gs>
+          </a:gsLst>
+          <a:lin ang="16200000" scaled="0"/>
+        </a:gradFill>
+      </a:fillStyleLst>
+      <a:lnStyleLst>
+        <a:ln w="9525" cap="flat" cmpd="sng" algn="ctr">
+          <a:solidFill>
+            <a:schemeClr val="phClr">
+              <a:shade val="95000"/>
+              <a:satMod val="105000"/>
+            </a:schemeClr>
+          </a:solidFill>
+          <a:prstDash val="solid"/>
+        </a:ln>
+        <a:ln w="25400" cap="flat" cmpd="sng" algn="ctr">
+          <a:solidFill>
+            <a:schemeClr val="phClr"/>
+          </a:solidFill>
+          <a:prstDash val="solid"/>
+        </a:ln>
+        <a:ln w="38100" cap="flat" cmpd="sng" algn="ctr">
+          <a:solidFill>
+            <a:schemeClr val="phClr"/>
+          </a:solidFill>
+          <a:prstDash val="solid"/>
+        </a:ln>
+      </a:lnStyleLst>
+      <a:effectStyleLst>
+        <a:effectStyle>
+          <a:effectLst>
+            <a:outerShdw blurRad="40000" dist="20000" dir="5400000" rotWithShape="0">
+              <a:srgbClr val="000000">
+                <a:alpha val="38000"/>
+              </a:srgbClr>
+            </a:outerShdw>
+          </a:effectLst>
+        </a:effectStyle>
+        <a:effectStyle>
+          <a:effectLst>
+            <a:outerShdw blurRad="40000" dist="23000" dir="5400000" rotWithShape="0">
+              <a:srgbClr val="000000">
+                <a:alpha val="35000"/>
+              </a:srgbClr>
+            </a:outerShdw>
+          </a:effectLst>
+        </a:effectStyle>
+        <a:effectStyle>
+          <a:effectLst>
+            <a:outerShdw blurRad="40000" dist="23000" dir="5400000" rotWithShape="0">
+              <a:srgbClr val="000000">
+                <a:alpha val="35000"/>
+              </a:srgbClr>
+            </a:outerShdw>
+          </a:effectLst>
+          <a:scene3d>
+            <a:camera prst="orthographicFront">
+              <a:rot lat="0" lon="0" rev="0"/>
+            </a:camera>
+            <a:lightRig rig="threePt" dir="t">
+              <a:rot lat="0" lon="0" rev="1200000"/>
+            </a:lightRig>
+          </a:scene3d>
+          <a:sp3d>
+            <a:bevelT w="63500" h="25400"/>
+          </a:sp3d>
+        </a:effectStyle>
+      </a:effectStyleLst>
+      <a:bgFillStyleLst>
+        <a:solidFill>
+          <a:schemeClr val="phClr"/>
+        </a:solidFill>
+        <a:gradFill rotWithShape="1">
+          <a:gsLst>
+            <a:gs pos="0">
+              <a:schemeClr val="phClr">
+                <a:tint val="40000"/>
+                <a:satMod val="350000"/>
+              </a:schemeClr>
+            </a:gs>
+            <a:gs pos="40000">
+              <a:schemeClr val="phClr">
+                <a:tint val="45000"/>
+                <a:shade val="99000"/>
+                <a:satMod val="350000"/>
+              </a:schemeClr>
+            </a:gs>
+            <a:gs pos="100000">
+              <a:schemeClr val="phClr">
+                <a:shade val="20000"/>
+                <a:satMod val="255000"/>
+              </a:schemeClr>
+            </a:gs>
+          </a:gsLst>
+          <a:path path="circle">
+            <a:fillToRect l="50000" t="-80000" r="50000" b="180000"/>
+          </a:path>
+        </a:gradFill>
+        <a:gradFill rotWithShape="1">
+          <a:gsLst>
+            <a:gs pos="0">
+              <a:schemeClr val="phClr">
+                <a:tint val="80000"/>
+                <a:satMod val="300000"/>
+              </a:schemeClr>
+            </a:gs>
+            <a:gs pos="100000">
+              <a:schemeClr val="phClr">
+                <a:shade val="30000"/>
+                <a:satMod val="200000"/>
+              </a:schemeClr>
+            </a:gs>
+          </a:gsLst>
+          <a:path path="circle">
+            <a:fillToRect l="50000" t="50000" r="50000" b="50000"/>
+          </a:path>
+        </a:gradFill>
+      </a:bgFillStyleLst>
+    </a:fmtScheme>
+  </a:themeElements>
+</a:theme>
+</file>
+
+<file path=ppt/theme/theme2.xml><?xml version="1.0" encoding="utf-8"?>
 <a:theme xmlns:a="http://schemas.openxmlformats.org/drawingml/2006/main" xmlns:r="http://schemas.openxmlformats.org/officeDocument/2006/relationships">
   <a:themeElements>
     <a:clrScheme name="Default">
@@ -27401,283 +27680,4 @@
     </a:fmtScheme>
   </a:themeElements>
 </a:theme>
-</file>
-
-<file path=ppt/theme/theme2.xml><?xml version="1.0" encoding="utf-8"?>
-<a:theme xmlns:a="http://schemas.openxmlformats.org/drawingml/2006/main" xmlns:r="http://schemas.openxmlformats.org/officeDocument/2006/relationships" name="Focus">
-  <a:themeElements>
-    <a:clrScheme name="Focus">
-      <a:dk1>
-        <a:srgbClr val="1B212C"/>
-      </a:dk1>
-      <a:lt1>
-        <a:srgbClr val="FFFFFF"/>
-      </a:lt1>
-      <a:dk2>
-        <a:srgbClr val="D9D9D9"/>
-      </a:dk2>
-      <a:lt2>
-        <a:srgbClr val="82C7A5"/>
-      </a:lt2>
-      <a:accent1>
-        <a:srgbClr val="0145AC"/>
-      </a:accent1>
-      <a:accent2>
-        <a:srgbClr val="EECE1A"/>
-      </a:accent2>
-      <a:accent3>
-        <a:srgbClr val="4E5567"/>
-      </a:accent3>
-      <a:accent4>
-        <a:srgbClr val="F4D6AD"/>
-      </a:accent4>
-      <a:accent5>
-        <a:srgbClr val="7890CD"/>
-      </a:accent5>
-      <a:accent6>
-        <a:srgbClr val="F15E22"/>
-      </a:accent6>
-      <a:hlink>
-        <a:srgbClr val="7890CD"/>
-      </a:hlink>
-      <a:folHlink>
-        <a:srgbClr val="7890CD"/>
-      </a:folHlink>
-    </a:clrScheme>
-    <a:fontScheme name="Office">
-      <a:majorFont>
-        <a:latin typeface="Arial"/>
-        <a:ea typeface=""/>
-        <a:cs typeface=""/>
-        <a:font script="Jpan" typeface="ＭＳ Ｐゴシック"/>
-        <a:font script="Hang" typeface="맑은 고딕"/>
-        <a:font script="Hans" typeface="宋体"/>
-        <a:font script="Hant" typeface="新細明體"/>
-        <a:font script="Arab" typeface="Times New Roman"/>
-        <a:font script="Hebr" typeface="Times New Roman"/>
-        <a:font script="Thai" typeface="Angsana New"/>
-        <a:font script="Ethi" typeface="Nyala"/>
-        <a:font script="Beng" typeface="Vrinda"/>
-        <a:font script="Gujr" typeface="Shruti"/>
-        <a:font script="Khmr" typeface="MoolBoran"/>
-        <a:font script="Knda" typeface="Tunga"/>
-        <a:font script="Guru" typeface="Raavi"/>
-        <a:font script="Cans" typeface="Euphemia"/>
-        <a:font script="Cher" typeface="Plantagenet Cherokee"/>
-        <a:font script="Yiii" typeface="Microsoft Yi Baiti"/>
-        <a:font script="Tibt" typeface="Microsoft Himalaya"/>
-        <a:font script="Thaa" typeface="MV Boli"/>
-        <a:font script="Deva" typeface="Mangal"/>
-        <a:font script="Telu" typeface="Gautami"/>
-        <a:font script="Taml" typeface="Latha"/>
-        <a:font script="Syrc" typeface="Estrangelo Edessa"/>
-        <a:font script="Orya" typeface="Kalinga"/>
-        <a:font script="Mlym" typeface="Kartika"/>
-        <a:font script="Laoo" typeface="DokChampa"/>
-        <a:font script="Sinh" typeface="Iskoola Pota"/>
-        <a:font script="Mong" typeface="Mongolian Baiti"/>
-        <a:font script="Viet" typeface="Times New Roman"/>
-        <a:font script="Uigh" typeface="Microsoft Uighur"/>
-        <a:font script="Geor" typeface="Sylfaen"/>
-      </a:majorFont>
-      <a:minorFont>
-        <a:latin typeface="Arial"/>
-        <a:ea typeface=""/>
-        <a:cs typeface=""/>
-        <a:font script="Jpan" typeface="ＭＳ Ｐゴシック"/>
-        <a:font script="Hang" typeface="맑은 고딕"/>
-        <a:font script="Hans" typeface="宋体"/>
-        <a:font script="Hant" typeface="新細明體"/>
-        <a:font script="Arab" typeface="Arial"/>
-        <a:font script="Hebr" typeface="Arial"/>
-        <a:font script="Thai" typeface="Cordia New"/>
-        <a:font script="Ethi" typeface="Nyala"/>
-        <a:font script="Beng" typeface="Vrinda"/>
-        <a:font script="Gujr" typeface="Shruti"/>
-        <a:font script="Khmr" typeface="DaunPenh"/>
-        <a:font script="Knda" typeface="Tunga"/>
-        <a:font script="Guru" typeface="Raavi"/>
-        <a:font script="Cans" typeface="Euphemia"/>
-        <a:font script="Cher" typeface="Plantagenet Cherokee"/>
-        <a:font script="Yiii" typeface="Microsoft Yi Baiti"/>
-        <a:font script="Tibt" typeface="Microsoft Himalaya"/>
-        <a:font script="Thaa" typeface="MV Boli"/>
-        <a:font script="Deva" typeface="Mangal"/>
-        <a:font script="Telu" typeface="Gautami"/>
-        <a:font script="Taml" typeface="Latha"/>
-        <a:font script="Syrc" typeface="Estrangelo Edessa"/>
-        <a:font script="Orya" typeface="Kalinga"/>
-        <a:font script="Mlym" typeface="Kartika"/>
-        <a:font script="Laoo" typeface="DokChampa"/>
-        <a:font script="Sinh" typeface="Iskoola Pota"/>
-        <a:font script="Mong" typeface="Mongolian Baiti"/>
-        <a:font script="Viet" typeface="Arial"/>
-        <a:font script="Uigh" typeface="Microsoft Uighur"/>
-        <a:font script="Geor" typeface="Sylfaen"/>
-      </a:minorFont>
-    </a:fontScheme>
-    <a:fmtScheme name="Office">
-      <a:fillStyleLst>
-        <a:solidFill>
-          <a:schemeClr val="phClr"/>
-        </a:solidFill>
-        <a:gradFill rotWithShape="1">
-          <a:gsLst>
-            <a:gs pos="0">
-              <a:schemeClr val="phClr">
-                <a:tint val="50000"/>
-                <a:satMod val="300000"/>
-              </a:schemeClr>
-            </a:gs>
-            <a:gs pos="35000">
-              <a:schemeClr val="phClr">
-                <a:tint val="37000"/>
-                <a:satMod val="300000"/>
-              </a:schemeClr>
-            </a:gs>
-            <a:gs pos="100000">
-              <a:schemeClr val="phClr">
-                <a:tint val="15000"/>
-                <a:satMod val="350000"/>
-              </a:schemeClr>
-            </a:gs>
-          </a:gsLst>
-          <a:lin ang="16200000" scaled="1"/>
-        </a:gradFill>
-        <a:gradFill rotWithShape="1">
-          <a:gsLst>
-            <a:gs pos="0">
-              <a:schemeClr val="phClr">
-                <a:tint val="100000"/>
-                <a:shade val="100000"/>
-                <a:satMod val="130000"/>
-              </a:schemeClr>
-            </a:gs>
-            <a:gs pos="100000">
-              <a:schemeClr val="phClr">
-                <a:tint val="50000"/>
-                <a:shade val="100000"/>
-                <a:satMod val="350000"/>
-              </a:schemeClr>
-            </a:gs>
-          </a:gsLst>
-          <a:lin ang="16200000" scaled="0"/>
-        </a:gradFill>
-      </a:fillStyleLst>
-      <a:lnStyleLst>
-        <a:ln w="9525" cap="flat" cmpd="sng" algn="ctr">
-          <a:solidFill>
-            <a:schemeClr val="phClr">
-              <a:shade val="95000"/>
-              <a:satMod val="105000"/>
-            </a:schemeClr>
-          </a:solidFill>
-          <a:prstDash val="solid"/>
-        </a:ln>
-        <a:ln w="25400" cap="flat" cmpd="sng" algn="ctr">
-          <a:solidFill>
-            <a:schemeClr val="phClr"/>
-          </a:solidFill>
-          <a:prstDash val="solid"/>
-        </a:ln>
-        <a:ln w="38100" cap="flat" cmpd="sng" algn="ctr">
-          <a:solidFill>
-            <a:schemeClr val="phClr"/>
-          </a:solidFill>
-          <a:prstDash val="solid"/>
-        </a:ln>
-      </a:lnStyleLst>
-      <a:effectStyleLst>
-        <a:effectStyle>
-          <a:effectLst>
-            <a:outerShdw blurRad="40000" dist="20000" dir="5400000" rotWithShape="0">
-              <a:srgbClr val="000000">
-                <a:alpha val="38000"/>
-              </a:srgbClr>
-            </a:outerShdw>
-          </a:effectLst>
-        </a:effectStyle>
-        <a:effectStyle>
-          <a:effectLst>
-            <a:outerShdw blurRad="40000" dist="23000" dir="5400000" rotWithShape="0">
-              <a:srgbClr val="000000">
-                <a:alpha val="35000"/>
-              </a:srgbClr>
-            </a:outerShdw>
-          </a:effectLst>
-        </a:effectStyle>
-        <a:effectStyle>
-          <a:effectLst>
-            <a:outerShdw blurRad="40000" dist="23000" dir="5400000" rotWithShape="0">
-              <a:srgbClr val="000000">
-                <a:alpha val="35000"/>
-              </a:srgbClr>
-            </a:outerShdw>
-          </a:effectLst>
-          <a:scene3d>
-            <a:camera prst="orthographicFront">
-              <a:rot lat="0" lon="0" rev="0"/>
-            </a:camera>
-            <a:lightRig rig="threePt" dir="t">
-              <a:rot lat="0" lon="0" rev="1200000"/>
-            </a:lightRig>
-          </a:scene3d>
-          <a:sp3d>
-            <a:bevelT w="63500" h="25400"/>
-          </a:sp3d>
-        </a:effectStyle>
-      </a:effectStyleLst>
-      <a:bgFillStyleLst>
-        <a:solidFill>
-          <a:schemeClr val="phClr"/>
-        </a:solidFill>
-        <a:gradFill rotWithShape="1">
-          <a:gsLst>
-            <a:gs pos="0">
-              <a:schemeClr val="phClr">
-                <a:tint val="40000"/>
-                <a:satMod val="350000"/>
-              </a:schemeClr>
-            </a:gs>
-            <a:gs pos="40000">
-              <a:schemeClr val="phClr">
-                <a:tint val="45000"/>
-                <a:shade val="99000"/>
-                <a:satMod val="350000"/>
-              </a:schemeClr>
-            </a:gs>
-            <a:gs pos="100000">
-              <a:schemeClr val="phClr">
-                <a:shade val="20000"/>
-                <a:satMod val="255000"/>
-              </a:schemeClr>
-            </a:gs>
-          </a:gsLst>
-          <a:path path="circle">
-            <a:fillToRect l="50000" t="-80000" r="50000" b="180000"/>
-          </a:path>
-        </a:gradFill>
-        <a:gradFill rotWithShape="1">
-          <a:gsLst>
-            <a:gs pos="0">
-              <a:schemeClr val="phClr">
-                <a:tint val="80000"/>
-                <a:satMod val="300000"/>
-              </a:schemeClr>
-            </a:gs>
-            <a:gs pos="100000">
-              <a:schemeClr val="phClr">
-                <a:shade val="30000"/>
-                <a:satMod val="200000"/>
-              </a:schemeClr>
-            </a:gs>
-          </a:gsLst>
-          <a:path path="circle">
-            <a:fillToRect l="50000" t="50000" r="50000" b="50000"/>
-          </a:path>
-        </a:gradFill>
-      </a:bgFillStyleLst>
-    </a:fmtScheme>
-  </a:themeElements>
-</a:theme>
 </file>
</xml_diff>